<commit_message>
Merge ppt with two other versions
</commit_message>
<xml_diff>
--- a/Presentation.pptx
+++ b/Presentation.pptx
@@ -5,7 +5,7 @@
     <p:sldMasterId id="2147483648" r:id="rId1"/>
   </p:sldMasterIdLst>
   <p:notesMasterIdLst>
-    <p:notesMasterId r:id="rId12"/>
+    <p:notesMasterId r:id="rId17"/>
   </p:notesMasterIdLst>
   <p:sldIdLst>
     <p:sldId id="256" r:id="rId2"/>
@@ -15,14 +15,19 @@
     <p:sldId id="311" r:id="rId6"/>
     <p:sldId id="319" r:id="rId7"/>
     <p:sldId id="320" r:id="rId8"/>
-    <p:sldId id="315" r:id="rId9"/>
-    <p:sldId id="318" r:id="rId10"/>
-    <p:sldId id="264" r:id="rId11"/>
+    <p:sldId id="324" r:id="rId9"/>
+    <p:sldId id="325" r:id="rId10"/>
+    <p:sldId id="315" r:id="rId11"/>
+    <p:sldId id="326" r:id="rId12"/>
+    <p:sldId id="321" r:id="rId13"/>
+    <p:sldId id="322" r:id="rId14"/>
+    <p:sldId id="318" r:id="rId15"/>
+    <p:sldId id="264" r:id="rId16"/>
   </p:sldIdLst>
   <p:sldSz cx="12192000" cy="6858000"/>
   <p:notesSz cx="6858000" cy="9144000"/>
   <p:custDataLst>
-    <p:tags r:id="rId13"/>
+    <p:tags r:id="rId18"/>
   </p:custDataLst>
   <p:defaultTextStyle>
     <a:defPPr>
@@ -209,7 +214,7 @@
           <a:p>
             <a:fld id="{BDA51940-DB52-3B48-AABB-9C7938529E4E}" type="datetimeFigureOut">
               <a:rPr kumimoji="1" lang="zh-CN" altLang="en-US" smtClean="0"/>
-              <a:t>2023/12/31</a:t>
+              <a:t>2024/1/1</a:t>
             </a:fld>
             <a:endParaRPr kumimoji="1" lang="zh-CN" altLang="en-US"/>
           </a:p>
@@ -686,9 +691,9 @@
             </a:lvl1pPr>
           </a:lstStyle>
           <a:p>
-            <a:fld id="{E4551058-E5DB-324A-A8E9-6D3BEF243C3B}" type="datetimeFigureOut">
-              <a:rPr kumimoji="1" lang="zh-CN" altLang="en-US" smtClean="0"/>
-              <a:t>2023/12/31</a:t>
+            <a:fld id="{6F1E9ED2-F061-0D43-9E56-0AC24EDD8273}" type="datetime1">
+              <a:rPr kumimoji="1" lang="de-DE" altLang="zh-CN" smtClean="0"/>
+              <a:t>01.01.24</a:t>
             </a:fld>
             <a:endParaRPr kumimoji="1" lang="zh-CN" altLang="en-US"/>
           </a:p>
@@ -1187,9 +1192,9 @@
           <a:bodyPr/>
           <a:lstStyle/>
           <a:p>
-            <a:fld id="{E4551058-E5DB-324A-A8E9-6D3BEF243C3B}" type="datetimeFigureOut">
-              <a:rPr kumimoji="1" lang="zh-CN" altLang="en-US" smtClean="0"/>
-              <a:t>2023/12/31</a:t>
+            <a:fld id="{DE62EA6E-4558-5747-8636-AACB178F7F76}" type="datetime1">
+              <a:rPr kumimoji="1" lang="de-DE" altLang="zh-CN" smtClean="0"/>
+              <a:t>01.01.24</a:t>
             </a:fld>
             <a:endParaRPr kumimoji="1" lang="zh-CN" altLang="en-US"/>
           </a:p>
@@ -1419,9 +1424,9 @@
           <a:bodyPr/>
           <a:lstStyle/>
           <a:p>
-            <a:fld id="{E4551058-E5DB-324A-A8E9-6D3BEF243C3B}" type="datetimeFigureOut">
-              <a:rPr kumimoji="1" lang="zh-CN" altLang="en-US" smtClean="0"/>
-              <a:t>2023/12/31</a:t>
+            <a:fld id="{84F06EFC-7293-A642-ACF4-AC2195103737}" type="datetime1">
+              <a:rPr kumimoji="1" lang="de-DE" altLang="zh-CN" smtClean="0"/>
+              <a:t>01.01.24</a:t>
             </a:fld>
             <a:endParaRPr kumimoji="1" lang="zh-CN" altLang="en-US"/>
           </a:p>
@@ -1674,9 +1679,9 @@
             </a:lvl1pPr>
           </a:lstStyle>
           <a:p>
-            <a:fld id="{E4551058-E5DB-324A-A8E9-6D3BEF243C3B}" type="datetimeFigureOut">
-              <a:rPr kumimoji="1" lang="zh-CN" altLang="en-US" smtClean="0"/>
-              <a:t>2023/12/31</a:t>
+            <a:fld id="{53D54B39-94FB-7C42-9D78-044344000460}" type="datetime1">
+              <a:rPr kumimoji="1" lang="de-DE" altLang="zh-CN" smtClean="0"/>
+              <a:t>01.01.24</a:t>
             </a:fld>
             <a:endParaRPr kumimoji="1" lang="zh-CN" altLang="en-US"/>
           </a:p>
@@ -1875,9 +1880,9 @@
           <a:bodyPr/>
           <a:lstStyle/>
           <a:p>
-            <a:fld id="{E4551058-E5DB-324A-A8E9-6D3BEF243C3B}" type="datetimeFigureOut">
-              <a:rPr kumimoji="1" lang="zh-CN" altLang="en-US" smtClean="0"/>
-              <a:t>2023/12/31</a:t>
+            <a:fld id="{090DC666-9098-2C48-ACD8-4076CF08A414}" type="datetime1">
+              <a:rPr kumimoji="1" lang="de-DE" altLang="zh-CN" smtClean="0"/>
+              <a:t>01.01.24</a:t>
             </a:fld>
             <a:endParaRPr kumimoji="1" lang="zh-CN" altLang="en-US"/>
           </a:p>
@@ -2144,9 +2149,9 @@
           <a:bodyPr/>
           <a:lstStyle/>
           <a:p>
-            <a:fld id="{E4551058-E5DB-324A-A8E9-6D3BEF243C3B}" type="datetimeFigureOut">
-              <a:rPr kumimoji="1" lang="zh-CN" altLang="en-US" smtClean="0"/>
-              <a:t>2023/12/31</a:t>
+            <a:fld id="{914E075D-9507-1E44-9C52-8593257F6940}" type="datetime1">
+              <a:rPr kumimoji="1" lang="de-DE" altLang="zh-CN" smtClean="0"/>
+              <a:t>01.01.24</a:t>
             </a:fld>
             <a:endParaRPr kumimoji="1" lang="zh-CN" altLang="en-US"/>
           </a:p>
@@ -2570,9 +2575,9 @@
             </a:lvl1pPr>
           </a:lstStyle>
           <a:p>
-            <a:fld id="{E4551058-E5DB-324A-A8E9-6D3BEF243C3B}" type="datetimeFigureOut">
-              <a:rPr kumimoji="1" lang="zh-CN" altLang="en-US" smtClean="0"/>
-              <a:t>2023/12/31</a:t>
+            <a:fld id="{1CB3C7F3-64A3-8E49-A5B5-EBEC479B3716}" type="datetime1">
+              <a:rPr kumimoji="1" lang="de-DE" altLang="zh-CN" smtClean="0"/>
+              <a:t>01.01.24</a:t>
             </a:fld>
             <a:endParaRPr kumimoji="1" lang="zh-CN" altLang="en-US"/>
           </a:p>
@@ -2843,9 +2848,9 @@
           <a:bodyPr/>
           <a:lstStyle/>
           <a:p>
-            <a:fld id="{E4551058-E5DB-324A-A8E9-6D3BEF243C3B}" type="datetimeFigureOut">
-              <a:rPr kumimoji="1" lang="zh-CN" altLang="en-US" smtClean="0"/>
-              <a:t>2023/12/31</a:t>
+            <a:fld id="{3573696B-ABE7-E143-B1C0-DDAF3A6704FD}" type="datetime1">
+              <a:rPr kumimoji="1" lang="de-DE" altLang="zh-CN" smtClean="0"/>
+              <a:t>01.01.24</a:t>
             </a:fld>
             <a:endParaRPr kumimoji="1" lang="zh-CN" altLang="en-US"/>
           </a:p>
@@ -3215,9 +3220,9 @@
           <a:bodyPr/>
           <a:lstStyle/>
           <a:p>
-            <a:fld id="{E4551058-E5DB-324A-A8E9-6D3BEF243C3B}" type="datetimeFigureOut">
-              <a:rPr kumimoji="1" lang="zh-CN" altLang="en-US" smtClean="0"/>
-              <a:t>2023/12/31</a:t>
+            <a:fld id="{FA69C65E-6629-3542-9FC9-108CC7CDB254}" type="datetime1">
+              <a:rPr kumimoji="1" lang="de-DE" altLang="zh-CN" smtClean="0"/>
+              <a:t>01.01.24</a:t>
             </a:fld>
             <a:endParaRPr kumimoji="1" lang="zh-CN" altLang="en-US"/>
           </a:p>
@@ -3327,9 +3332,9 @@
           <a:bodyPr/>
           <a:lstStyle/>
           <a:p>
-            <a:fld id="{E4551058-E5DB-324A-A8E9-6D3BEF243C3B}" type="datetimeFigureOut">
-              <a:rPr kumimoji="1" lang="zh-CN" altLang="en-US" smtClean="0"/>
-              <a:t>2023/12/31</a:t>
+            <a:fld id="{F268555C-F6A9-B44E-9801-F57C5385E97D}" type="datetime1">
+              <a:rPr kumimoji="1" lang="de-DE" altLang="zh-CN" smtClean="0"/>
+              <a:t>01.01.24</a:t>
             </a:fld>
             <a:endParaRPr kumimoji="1" lang="zh-CN" altLang="en-US"/>
           </a:p>
@@ -3439,9 +3444,9 @@
           <a:bodyPr/>
           <a:lstStyle/>
           <a:p>
-            <a:fld id="{E4551058-E5DB-324A-A8E9-6D3BEF243C3B}" type="datetimeFigureOut">
-              <a:rPr kumimoji="1" lang="zh-CN" altLang="en-US" smtClean="0"/>
-              <a:t>2023/12/31</a:t>
+            <a:fld id="{D8FA55C7-81E3-3F40-91AA-4A477421FD10}" type="datetime1">
+              <a:rPr kumimoji="1" lang="de-DE" altLang="zh-CN" smtClean="0"/>
+              <a:t>01.01.24</a:t>
             </a:fld>
             <a:endParaRPr kumimoji="1" lang="zh-CN" altLang="en-US"/>
           </a:p>
@@ -3921,9 +3926,9 @@
             </a:lvl1pPr>
           </a:lstStyle>
           <a:p>
-            <a:fld id="{E4551058-E5DB-324A-A8E9-6D3BEF243C3B}" type="datetimeFigureOut">
-              <a:rPr kumimoji="1" lang="zh-CN" altLang="en-US" smtClean="0"/>
-              <a:t>2023/12/31</a:t>
+            <a:fld id="{F0D94051-2F1F-E441-8619-D3BC0A046072}" type="datetime1">
+              <a:rPr kumimoji="1" lang="de-DE" altLang="zh-CN" smtClean="0"/>
+              <a:t>01.01.24</a:t>
             </a:fld>
             <a:endParaRPr kumimoji="1" lang="zh-CN" altLang="en-US"/>
           </a:p>
@@ -4278,9 +4283,9 @@
             </a:lvl1pPr>
           </a:lstStyle>
           <a:p>
-            <a:fld id="{E4551058-E5DB-324A-A8E9-6D3BEF243C3B}" type="datetimeFigureOut">
-              <a:rPr kumimoji="1" lang="zh-CN" altLang="en-US" smtClean="0"/>
-              <a:t>2023/12/31</a:t>
+            <a:fld id="{D167A885-2769-6648-8F7B-C374CCFFA861}" type="datetime1">
+              <a:rPr kumimoji="1" lang="de-DE" altLang="zh-CN" smtClean="0"/>
+              <a:t>01.01.24</a:t>
             </a:fld>
             <a:endParaRPr kumimoji="1" lang="zh-CN" altLang="en-US"/>
           </a:p>
@@ -4410,6 +4415,7 @@
     <p:sldLayoutId id="2147483659" r:id="rId11"/>
     <p:sldLayoutId id="2147483660" r:id="rId12"/>
   </p:sldLayoutIdLst>
+  <p:hf hdr="0" ftr="0" dt="0"/>
   <p:txStyles>
     <p:titleStyle>
       <a:lvl1pPr algn="l" defTabSz="457200" rtl="0" eaLnBrk="1" latinLnBrk="0" hangingPunct="1">
@@ -4875,6 +4881,35 @@
           </a:p>
         </p:txBody>
       </p:sp>
+      <p:sp>
+        <p:nvSpPr>
+          <p:cNvPr id="4" name="Foliennummernplatzhalter 3">
+            <a:extLst>
+              <a:ext uri="{FF2B5EF4-FFF2-40B4-BE49-F238E27FC236}">
+                <a16:creationId xmlns:a16="http://schemas.microsoft.com/office/drawing/2014/main" id="{85CBE7AF-2C8D-6F65-8909-5E128E21C982}"/>
+              </a:ext>
+            </a:extLst>
+          </p:cNvPr>
+          <p:cNvSpPr>
+            <a:spLocks noGrp="1"/>
+          </p:cNvSpPr>
+          <p:nvPr>
+            <p:ph type="sldNum" sz="quarter" idx="12"/>
+          </p:nvPr>
+        </p:nvSpPr>
+        <p:spPr/>
+        <p:txBody>
+          <a:bodyPr/>
+          <a:lstStyle/>
+          <a:p>
+            <a:fld id="{977BA8E6-E826-B147-AA17-E3D76A29629C}" type="slidenum">
+              <a:rPr kumimoji="1" lang="zh-CN" altLang="en-US" smtClean="0"/>
+              <a:t>1</a:t>
+            </a:fld>
+            <a:endParaRPr kumimoji="1" lang="zh-CN" altLang="en-US"/>
+          </a:p>
+        </p:txBody>
+      </p:sp>
     </p:spTree>
   </p:cSld>
   <p:clrMapOvr>
@@ -4902,48 +4937,1113 @@
       </p:grpSpPr>
       <p:sp>
         <p:nvSpPr>
-          <p:cNvPr id="2" name="标题 1"/>
-          <p:cNvSpPr>
-            <a:spLocks noGrp="1"/>
-          </p:cNvSpPr>
-          <p:nvPr>
-            <p:ph type="ctrTitle"/>
-          </p:nvPr>
-        </p:nvSpPr>
-        <p:spPr/>
-        <p:txBody>
-          <a:bodyPr/>
-          <a:lstStyle/>
-          <a:p>
-            <a:r>
-              <a:rPr kumimoji="1" lang="en-US" altLang="zh-CN" dirty="0"/>
-              <a:t>Thank you!</a:t>
-            </a:r>
-            <a:endParaRPr kumimoji="1" lang="zh-CN" altLang="en-US" dirty="0"/>
-          </a:p>
-        </p:txBody>
-      </p:sp>
-      <p:sp>
-        <p:nvSpPr>
-          <p:cNvPr id="3" name="副标题 2"/>
-          <p:cNvSpPr>
-            <a:spLocks noGrp="1"/>
-          </p:cNvSpPr>
-          <p:nvPr>
-            <p:ph type="subTitle" idx="1"/>
-          </p:nvPr>
-        </p:nvSpPr>
-        <p:spPr/>
+          <p:cNvPr id="2" name="内容占位符 1"/>
+          <p:cNvSpPr>
+            <a:spLocks noGrp="1"/>
+          </p:cNvSpPr>
+          <p:nvPr>
+            <p:ph idx="1"/>
+          </p:nvPr>
+        </p:nvSpPr>
+        <p:spPr>
+          <a:xfrm>
+            <a:off x="581025" y="2090420"/>
+            <a:ext cx="11029315" cy="4341495"/>
+          </a:xfrm>
+        </p:spPr>
         <p:txBody>
           <a:bodyPr>
             <a:normAutofit/>
           </a:bodyPr>
           <a:lstStyle/>
           <a:p>
+            <a:r>
+              <a:rPr kumimoji="1" lang="en-US" altLang="zh-CN" dirty="0"/>
+              <a:t>Simple RNN</a:t>
+            </a:r>
+          </a:p>
+          <a:p>
+            <a:pPr lvl="1"/>
+            <a:r>
+              <a:rPr kumimoji="1" lang="en-US" altLang="zh-CN" dirty="0"/>
+              <a:t>Layers, Learning Rate, Batch Size, Optimizer……</a:t>
+            </a:r>
+          </a:p>
+          <a:p>
+            <a:r>
+              <a:rPr kumimoji="1" lang="en-US" altLang="zh-CN" dirty="0"/>
+              <a:t>Add Ensemble </a:t>
+            </a:r>
+          </a:p>
+          <a:p>
+            <a:pPr lvl="1"/>
+            <a:r>
+              <a:rPr kumimoji="1" lang="en-US" altLang="zh-CN" dirty="0"/>
+              <a:t>Models Vote to Get the Final Prediction</a:t>
+            </a:r>
+          </a:p>
+          <a:p>
+            <a:pPr lvl="0"/>
+            <a:r>
+              <a:rPr kumimoji="1" lang="en-US" altLang="zh-CN" dirty="0"/>
+              <a:t>Use Meta Model</a:t>
+            </a:r>
+          </a:p>
+          <a:p>
+            <a:pPr lvl="1"/>
+            <a:r>
+              <a:rPr kumimoji="1" lang="en-US" altLang="zh-CN" dirty="0"/>
+              <a:t>Model Makes Final Prediction Based on the Base Models’ Prediction</a:t>
+            </a:r>
+          </a:p>
+          <a:p>
+            <a:pPr lvl="0"/>
+            <a:r>
+              <a:rPr kumimoji="1" lang="en-US" altLang="zh-CN" dirty="0"/>
+              <a:t>Parameter </a:t>
+            </a:r>
+            <a:r>
+              <a:rPr lang="en-US" dirty="0">
+                <a:sym typeface="+mn-ea"/>
+              </a:rPr>
+              <a:t>Tuning</a:t>
+            </a:r>
+          </a:p>
+          <a:p>
+            <a:pPr lvl="1"/>
+            <a:r>
+              <a:rPr lang="en-US" dirty="0">
+                <a:sym typeface="+mn-ea"/>
+              </a:rPr>
+              <a:t>Using </a:t>
+            </a:r>
+            <a:r>
+              <a:rPr lang="en-US" dirty="0" err="1">
+                <a:sym typeface="+mn-ea"/>
+              </a:rPr>
+              <a:t>Optuna</a:t>
+            </a:r>
+            <a:r>
+              <a:rPr lang="en-US" dirty="0">
+                <a:sym typeface="+mn-ea"/>
+              </a:rPr>
+              <a:t> to Find a Set of Parameters Which Maximizes the Accuracy</a:t>
+            </a:r>
+          </a:p>
+        </p:txBody>
+      </p:sp>
+      <p:sp>
+        <p:nvSpPr>
+          <p:cNvPr id="3" name="标题 2"/>
+          <p:cNvSpPr>
+            <a:spLocks noGrp="1"/>
+          </p:cNvSpPr>
+          <p:nvPr>
+            <p:ph type="title"/>
+          </p:nvPr>
+        </p:nvSpPr>
+        <p:spPr/>
+        <p:txBody>
+          <a:bodyPr/>
+          <a:lstStyle/>
+          <a:p>
+            <a:r>
+              <a:rPr lang="en-US" dirty="0"/>
+              <a:t>What we do with rnn and what we get</a:t>
+            </a:r>
+          </a:p>
+        </p:txBody>
+      </p:sp>
+      <p:sp>
+        <p:nvSpPr>
+          <p:cNvPr id="4" name="Foliennummernplatzhalter 3">
+            <a:extLst>
+              <a:ext uri="{FF2B5EF4-FFF2-40B4-BE49-F238E27FC236}">
+                <a16:creationId xmlns:a16="http://schemas.microsoft.com/office/drawing/2014/main" id="{391AF981-5A81-156E-BC2C-109CDC14269D}"/>
+              </a:ext>
+            </a:extLst>
+          </p:cNvPr>
+          <p:cNvSpPr>
+            <a:spLocks noGrp="1"/>
+          </p:cNvSpPr>
+          <p:nvPr>
+            <p:ph type="sldNum" sz="quarter" idx="12"/>
+          </p:nvPr>
+        </p:nvSpPr>
+        <p:spPr/>
+        <p:txBody>
+          <a:bodyPr/>
+          <a:lstStyle/>
+          <a:p>
+            <a:fld id="{977BA8E6-E826-B147-AA17-E3D76A29629C}" type="slidenum">
+              <a:rPr kumimoji="1" lang="zh-CN" altLang="en-US" smtClean="0"/>
+              <a:t>10</a:t>
+            </a:fld>
+            <a:endParaRPr kumimoji="1" lang="zh-CN" altLang="en-US"/>
+          </a:p>
+        </p:txBody>
+      </p:sp>
+    </p:spTree>
+  </p:cSld>
+  <p:clrMapOvr>
+    <a:masterClrMapping/>
+  </p:clrMapOvr>
+</p:sld>
+</file>
+
+<file path=ppt/slides/slide11.xml><?xml version="1.0" encoding="utf-8"?>
+<p:sld xmlns:a="http://schemas.openxmlformats.org/drawingml/2006/main" xmlns:r="http://schemas.openxmlformats.org/officeDocument/2006/relationships" xmlns:p="http://schemas.openxmlformats.org/presentationml/2006/main">
+  <p:cSld>
+    <p:spTree>
+      <p:nvGrpSpPr>
+        <p:cNvPr id="1" name=""/>
+        <p:cNvGrpSpPr/>
+        <p:nvPr/>
+      </p:nvGrpSpPr>
+      <p:grpSpPr>
+        <a:xfrm>
+          <a:off x="0" y="0"/>
+          <a:ext cx="0" cy="0"/>
+          <a:chOff x="0" y="0"/>
+          <a:chExt cx="0" cy="0"/>
+        </a:xfrm>
+      </p:grpSpPr>
+      <p:sp>
+        <p:nvSpPr>
+          <p:cNvPr id="2" name="内容占位符 1"/>
+          <p:cNvSpPr>
+            <a:spLocks noGrp="1"/>
+          </p:cNvSpPr>
+          <p:nvPr>
+            <p:ph idx="1"/>
+          </p:nvPr>
+        </p:nvSpPr>
+        <p:spPr/>
+        <p:txBody>
+          <a:bodyPr>
+            <a:normAutofit/>
+          </a:bodyPr>
+          <a:lstStyle/>
+          <a:p>
+            <a:pPr lvl="1"/>
+            <a:r>
+              <a:rPr kumimoji="1" lang="en-US" altLang="zh-CN" sz="1800" dirty="0">
+                <a:sym typeface="+mn-ea"/>
+              </a:rPr>
+              <a:t>Which Data Should We Select as Features ?</a:t>
+            </a:r>
+          </a:p>
+          <a:p>
+            <a:pPr lvl="2"/>
+            <a:r>
+              <a:rPr kumimoji="1" lang="en-US" altLang="zh-CN" sz="1600" dirty="0">
+                <a:sym typeface="+mn-ea"/>
+              </a:rPr>
+              <a:t>For RNN  we organize the data into a time series matrix while retaining the original features</a:t>
+            </a:r>
+          </a:p>
+          <a:p>
+            <a:pPr lvl="2"/>
+            <a:r>
+              <a:rPr kumimoji="1" lang="en-US" altLang="zh-CN" sz="1600" dirty="0">
+                <a:sym typeface="+mn-ea"/>
+              </a:rPr>
+              <a:t>For traditional machine learning methods, we remove the time column, flatten the data, and use the entire dataset as features</a:t>
+            </a:r>
+          </a:p>
+          <a:p>
+            <a:pPr lvl="1"/>
+            <a:r>
+              <a:rPr kumimoji="1" lang="en-US" altLang="zh-CN" sz="1800" dirty="0">
+                <a:sym typeface="+mn-ea"/>
+              </a:rPr>
+              <a:t>What are the drawbacks of these practices ?</a:t>
+            </a:r>
+          </a:p>
+          <a:p>
+            <a:pPr lvl="1"/>
+            <a:r>
+              <a:rPr kumimoji="1" lang="en-US" altLang="zh-CN" sz="1800" dirty="0">
+                <a:sym typeface="+mn-ea"/>
+              </a:rPr>
+              <a:t>What about PCA ?</a:t>
+            </a:r>
+          </a:p>
+          <a:p>
+            <a:pPr lvl="1"/>
+            <a:r>
+              <a:rPr kumimoji="1" lang="en-US" altLang="zh-CN" sz="1800" dirty="0">
+                <a:sym typeface="+mn-ea"/>
+              </a:rPr>
+              <a:t>How can we visualize the importance of each feature ?</a:t>
+            </a:r>
+          </a:p>
+          <a:p>
+            <a:pPr lvl="1"/>
+            <a:r>
+              <a:rPr kumimoji="1" lang="en-US" altLang="zh-CN" sz="1800" dirty="0">
+                <a:sym typeface="+mn-ea"/>
+              </a:rPr>
+              <a:t>How can we visualize the impact of each feature on the decision ?</a:t>
+            </a:r>
+          </a:p>
+          <a:p>
+            <a:pPr lvl="1"/>
+            <a:endParaRPr kumimoji="1" lang="en-US" altLang="zh-CN" sz="1800" dirty="0">
+              <a:sym typeface="+mn-ea"/>
+            </a:endParaRPr>
+          </a:p>
+          <a:p>
+            <a:pPr lvl="1"/>
+            <a:endParaRPr kumimoji="1" lang="en-US" altLang="zh-CN" dirty="0">
+              <a:sym typeface="+mn-ea"/>
+            </a:endParaRPr>
+          </a:p>
+          <a:p>
+            <a:pPr marL="629920" lvl="2" indent="0">
+              <a:buNone/>
+            </a:pPr>
+            <a:endParaRPr kumimoji="1" lang="en-US" altLang="zh-CN" dirty="0">
+              <a:sym typeface="+mn-ea"/>
+            </a:endParaRPr>
+          </a:p>
+          <a:p>
             <a:endParaRPr kumimoji="1" lang="en-US" altLang="zh-CN" dirty="0"/>
           </a:p>
+        </p:txBody>
+      </p:sp>
+      <p:sp>
+        <p:nvSpPr>
+          <p:cNvPr id="3" name="标题 2"/>
+          <p:cNvSpPr>
+            <a:spLocks noGrp="1"/>
+          </p:cNvSpPr>
+          <p:nvPr>
+            <p:ph type="title"/>
+          </p:nvPr>
+        </p:nvSpPr>
+        <p:spPr/>
+        <p:txBody>
+          <a:bodyPr/>
+          <a:lstStyle/>
+          <a:p>
+            <a:r>
+              <a:rPr kumimoji="1" lang="en-US" altLang="zh-CN" dirty="0">
+                <a:sym typeface="+mn-ea"/>
+              </a:rPr>
+              <a:t>What We Found in Feature Engineering</a:t>
+            </a:r>
+            <a:endParaRPr lang="en-US" dirty="0"/>
+          </a:p>
+        </p:txBody>
+      </p:sp>
+      <p:sp>
+        <p:nvSpPr>
+          <p:cNvPr id="4" name="Foliennummernplatzhalter 3">
+            <a:extLst>
+              <a:ext uri="{FF2B5EF4-FFF2-40B4-BE49-F238E27FC236}">
+                <a16:creationId xmlns:a16="http://schemas.microsoft.com/office/drawing/2014/main" id="{356163E6-8EBE-231F-C7D3-B88D99C1CC5B}"/>
+              </a:ext>
+            </a:extLst>
+          </p:cNvPr>
+          <p:cNvSpPr>
+            <a:spLocks noGrp="1"/>
+          </p:cNvSpPr>
+          <p:nvPr>
+            <p:ph type="sldNum" sz="quarter" idx="12"/>
+          </p:nvPr>
+        </p:nvSpPr>
+        <p:spPr/>
+        <p:txBody>
+          <a:bodyPr/>
+          <a:lstStyle/>
+          <a:p>
+            <a:fld id="{977BA8E6-E826-B147-AA17-E3D76A29629C}" type="slidenum">
+              <a:rPr kumimoji="1" lang="zh-CN" altLang="en-US" smtClean="0"/>
+              <a:t>11</a:t>
+            </a:fld>
+            <a:endParaRPr kumimoji="1" lang="zh-CN" altLang="en-US"/>
+          </a:p>
+        </p:txBody>
+      </p:sp>
+    </p:spTree>
+  </p:cSld>
+  <p:clrMapOvr>
+    <a:masterClrMapping/>
+  </p:clrMapOvr>
+</p:sld>
+</file>
+
+<file path=ppt/slides/slide12.xml><?xml version="1.0" encoding="utf-8"?>
+<p:sld xmlns:a="http://schemas.openxmlformats.org/drawingml/2006/main" xmlns:r="http://schemas.openxmlformats.org/officeDocument/2006/relationships" xmlns:p="http://schemas.openxmlformats.org/presentationml/2006/main">
+  <p:cSld>
+    <p:spTree>
+      <p:nvGrpSpPr>
+        <p:cNvPr id="1" name=""/>
+        <p:cNvGrpSpPr/>
+        <p:nvPr/>
+      </p:nvGrpSpPr>
+      <p:grpSpPr>
+        <a:xfrm>
+          <a:off x="0" y="0"/>
+          <a:ext cx="0" cy="0"/>
+          <a:chOff x="0" y="0"/>
+          <a:chExt cx="0" cy="0"/>
+        </a:xfrm>
+      </p:grpSpPr>
+      <p:sp>
+        <p:nvSpPr>
+          <p:cNvPr id="2" name="内容占位符 1"/>
+          <p:cNvSpPr>
+            <a:spLocks noGrp="1"/>
+          </p:cNvSpPr>
+          <p:nvPr>
+            <p:ph idx="1"/>
+          </p:nvPr>
+        </p:nvSpPr>
+        <p:spPr/>
+        <p:txBody>
+          <a:bodyPr>
+            <a:normAutofit/>
+          </a:bodyPr>
+          <a:lstStyle/>
+          <a:p>
+            <a:pPr lvl="1"/>
+            <a:r>
+              <a:rPr kumimoji="1" lang="en-US" altLang="zh-CN" sz="1800" dirty="0">
+                <a:sym typeface="+mn-ea"/>
+              </a:rPr>
+              <a:t>How can we visualize the importance of each feature ?</a:t>
+            </a:r>
+          </a:p>
+          <a:p>
+            <a:pPr lvl="1"/>
+            <a:endParaRPr kumimoji="1" lang="en-US" altLang="zh-CN" sz="1800" dirty="0">
+              <a:sym typeface="+mn-ea"/>
+            </a:endParaRPr>
+          </a:p>
+          <a:p>
+            <a:pPr lvl="1"/>
+            <a:endParaRPr kumimoji="1" lang="en-US" altLang="zh-CN" dirty="0">
+              <a:sym typeface="+mn-ea"/>
+            </a:endParaRPr>
+          </a:p>
+          <a:p>
+            <a:pPr marL="629920" lvl="2" indent="0">
+              <a:buNone/>
+            </a:pPr>
+            <a:endParaRPr kumimoji="1" lang="en-US" altLang="zh-CN" dirty="0">
+              <a:sym typeface="+mn-ea"/>
+            </a:endParaRPr>
+          </a:p>
           <a:p>
             <a:endParaRPr kumimoji="1" lang="en-US" altLang="zh-CN" dirty="0"/>
+          </a:p>
+        </p:txBody>
+      </p:sp>
+      <p:sp>
+        <p:nvSpPr>
+          <p:cNvPr id="3" name="标题 2"/>
+          <p:cNvSpPr>
+            <a:spLocks noGrp="1"/>
+          </p:cNvSpPr>
+          <p:nvPr>
+            <p:ph type="title"/>
+          </p:nvPr>
+        </p:nvSpPr>
+        <p:spPr/>
+        <p:txBody>
+          <a:bodyPr/>
+          <a:lstStyle/>
+          <a:p>
+            <a:r>
+              <a:rPr kumimoji="1" lang="en-US" altLang="zh-CN" dirty="0">
+                <a:sym typeface="+mn-ea"/>
+              </a:rPr>
+              <a:t>What We Found in Feature Engineering</a:t>
+            </a:r>
+            <a:endParaRPr lang="en-US" dirty="0"/>
+          </a:p>
+        </p:txBody>
+      </p:sp>
+      <p:pic>
+        <p:nvPicPr>
+          <p:cNvPr id="6" name="图片 5"/>
+          <p:cNvPicPr>
+            <a:picLocks noChangeAspect="1"/>
+          </p:cNvPicPr>
+          <p:nvPr>
+            <p:custDataLst>
+              <p:tags r:id="rId1"/>
+            </p:custDataLst>
+          </p:nvPr>
+        </p:nvPicPr>
+        <p:blipFill>
+          <a:blip r:embed="rId7"/>
+          <a:stretch>
+            <a:fillRect/>
+          </a:stretch>
+        </p:blipFill>
+        <p:spPr>
+          <a:xfrm>
+            <a:off x="775970" y="2688590"/>
+            <a:ext cx="4637405" cy="3169920"/>
+          </a:xfrm>
+          <a:prstGeom prst="rect">
+            <a:avLst/>
+          </a:prstGeom>
+        </p:spPr>
+      </p:pic>
+      <p:pic>
+        <p:nvPicPr>
+          <p:cNvPr id="8" name="图片 7"/>
+          <p:cNvPicPr>
+            <a:picLocks noChangeAspect="1"/>
+          </p:cNvPicPr>
+          <p:nvPr>
+            <p:custDataLst>
+              <p:tags r:id="rId2"/>
+            </p:custDataLst>
+          </p:nvPr>
+        </p:nvPicPr>
+        <p:blipFill>
+          <a:blip r:embed="rId8"/>
+          <a:stretch>
+            <a:fillRect/>
+          </a:stretch>
+        </p:blipFill>
+        <p:spPr>
+          <a:xfrm>
+            <a:off x="5719445" y="2688590"/>
+            <a:ext cx="3051810" cy="1468120"/>
+          </a:xfrm>
+          <a:prstGeom prst="rect">
+            <a:avLst/>
+          </a:prstGeom>
+        </p:spPr>
+      </p:pic>
+      <p:pic>
+        <p:nvPicPr>
+          <p:cNvPr id="9" name="图片 8"/>
+          <p:cNvPicPr>
+            <a:picLocks noChangeAspect="1"/>
+          </p:cNvPicPr>
+          <p:nvPr>
+            <p:custDataLst>
+              <p:tags r:id="rId3"/>
+            </p:custDataLst>
+          </p:nvPr>
+        </p:nvPicPr>
+        <p:blipFill>
+          <a:blip r:embed="rId9"/>
+          <a:stretch>
+            <a:fillRect/>
+          </a:stretch>
+        </p:blipFill>
+        <p:spPr>
+          <a:xfrm>
+            <a:off x="8909050" y="2696845"/>
+            <a:ext cx="3034030" cy="1459865"/>
+          </a:xfrm>
+          <a:prstGeom prst="rect">
+            <a:avLst/>
+          </a:prstGeom>
+        </p:spPr>
+      </p:pic>
+      <p:pic>
+        <p:nvPicPr>
+          <p:cNvPr id="10" name="图片 9"/>
+          <p:cNvPicPr>
+            <a:picLocks noChangeAspect="1"/>
+          </p:cNvPicPr>
+          <p:nvPr>
+            <p:custDataLst>
+              <p:tags r:id="rId4"/>
+            </p:custDataLst>
+          </p:nvPr>
+        </p:nvPicPr>
+        <p:blipFill>
+          <a:blip r:embed="rId10"/>
+          <a:stretch>
+            <a:fillRect/>
+          </a:stretch>
+        </p:blipFill>
+        <p:spPr>
+          <a:xfrm>
+            <a:off x="5719445" y="4389755"/>
+            <a:ext cx="3051810" cy="1468755"/>
+          </a:xfrm>
+          <a:prstGeom prst="rect">
+            <a:avLst/>
+          </a:prstGeom>
+        </p:spPr>
+      </p:pic>
+      <p:pic>
+        <p:nvPicPr>
+          <p:cNvPr id="11" name="图片 10"/>
+          <p:cNvPicPr>
+            <a:picLocks noChangeAspect="1"/>
+          </p:cNvPicPr>
+          <p:nvPr>
+            <p:custDataLst>
+              <p:tags r:id="rId5"/>
+            </p:custDataLst>
+          </p:nvPr>
+        </p:nvPicPr>
+        <p:blipFill>
+          <a:blip r:embed="rId11"/>
+          <a:stretch>
+            <a:fillRect/>
+          </a:stretch>
+        </p:blipFill>
+        <p:spPr>
+          <a:xfrm>
+            <a:off x="8909050" y="4389755"/>
+            <a:ext cx="3034665" cy="1461135"/>
+          </a:xfrm>
+          <a:prstGeom prst="rect">
+            <a:avLst/>
+          </a:prstGeom>
+        </p:spPr>
+      </p:pic>
+      <p:sp>
+        <p:nvSpPr>
+          <p:cNvPr id="4" name="Foliennummernplatzhalter 3">
+            <a:extLst>
+              <a:ext uri="{FF2B5EF4-FFF2-40B4-BE49-F238E27FC236}">
+                <a16:creationId xmlns:a16="http://schemas.microsoft.com/office/drawing/2014/main" id="{89C2FF3D-CFDF-B50B-76DE-739698632670}"/>
+              </a:ext>
+            </a:extLst>
+          </p:cNvPr>
+          <p:cNvSpPr>
+            <a:spLocks noGrp="1"/>
+          </p:cNvSpPr>
+          <p:nvPr>
+            <p:ph type="sldNum" sz="quarter" idx="12"/>
+          </p:nvPr>
+        </p:nvSpPr>
+        <p:spPr/>
+        <p:txBody>
+          <a:bodyPr/>
+          <a:lstStyle/>
+          <a:p>
+            <a:fld id="{977BA8E6-E826-B147-AA17-E3D76A29629C}" type="slidenum">
+              <a:rPr kumimoji="1" lang="zh-CN" altLang="en-US" smtClean="0"/>
+              <a:t>12</a:t>
+            </a:fld>
+            <a:endParaRPr kumimoji="1" lang="zh-CN" altLang="en-US"/>
+          </a:p>
+        </p:txBody>
+      </p:sp>
+    </p:spTree>
+  </p:cSld>
+  <p:clrMapOvr>
+    <a:masterClrMapping/>
+  </p:clrMapOvr>
+</p:sld>
+</file>
+
+<file path=ppt/slides/slide13.xml><?xml version="1.0" encoding="utf-8"?>
+<p:sld xmlns:a="http://schemas.openxmlformats.org/drawingml/2006/main" xmlns:r="http://schemas.openxmlformats.org/officeDocument/2006/relationships" xmlns:p="http://schemas.openxmlformats.org/presentationml/2006/main">
+  <p:cSld>
+    <p:spTree>
+      <p:nvGrpSpPr>
+        <p:cNvPr id="1" name=""/>
+        <p:cNvGrpSpPr/>
+        <p:nvPr/>
+      </p:nvGrpSpPr>
+      <p:grpSpPr>
+        <a:xfrm>
+          <a:off x="0" y="0"/>
+          <a:ext cx="0" cy="0"/>
+          <a:chOff x="0" y="0"/>
+          <a:chExt cx="0" cy="0"/>
+        </a:xfrm>
+      </p:grpSpPr>
+      <p:sp>
+        <p:nvSpPr>
+          <p:cNvPr id="2" name="内容占位符 1"/>
+          <p:cNvSpPr>
+            <a:spLocks noGrp="1"/>
+          </p:cNvSpPr>
+          <p:nvPr>
+            <p:ph idx="1"/>
+          </p:nvPr>
+        </p:nvSpPr>
+        <p:spPr/>
+        <p:txBody>
+          <a:bodyPr>
+            <a:normAutofit/>
+          </a:bodyPr>
+          <a:lstStyle/>
+          <a:p>
+            <a:pPr lvl="1"/>
+            <a:r>
+              <a:rPr kumimoji="1" lang="en-US" altLang="zh-CN" sz="1800" dirty="0">
+                <a:sym typeface="+mn-ea"/>
+              </a:rPr>
+              <a:t>How can we visualize the importance of each feature ?</a:t>
+            </a:r>
+          </a:p>
+          <a:p>
+            <a:pPr lvl="1"/>
+            <a:endParaRPr kumimoji="1" lang="en-US" altLang="zh-CN" sz="1800" dirty="0">
+              <a:sym typeface="+mn-ea"/>
+            </a:endParaRPr>
+          </a:p>
+          <a:p>
+            <a:pPr lvl="1"/>
+            <a:endParaRPr kumimoji="1" lang="en-US" altLang="zh-CN" dirty="0">
+              <a:sym typeface="+mn-ea"/>
+            </a:endParaRPr>
+          </a:p>
+          <a:p>
+            <a:pPr marL="629920" lvl="2" indent="0">
+              <a:buNone/>
+            </a:pPr>
+            <a:endParaRPr kumimoji="1" lang="en-US" altLang="zh-CN" dirty="0">
+              <a:sym typeface="+mn-ea"/>
+            </a:endParaRPr>
+          </a:p>
+          <a:p>
+            <a:endParaRPr kumimoji="1" lang="en-US" altLang="zh-CN" dirty="0"/>
+          </a:p>
+        </p:txBody>
+      </p:sp>
+      <p:sp>
+        <p:nvSpPr>
+          <p:cNvPr id="3" name="标题 2"/>
+          <p:cNvSpPr>
+            <a:spLocks noGrp="1"/>
+          </p:cNvSpPr>
+          <p:nvPr>
+            <p:ph type="title"/>
+          </p:nvPr>
+        </p:nvSpPr>
+        <p:spPr/>
+        <p:txBody>
+          <a:bodyPr/>
+          <a:lstStyle/>
+          <a:p>
+            <a:r>
+              <a:rPr kumimoji="1" lang="en-US" altLang="zh-CN" dirty="0">
+                <a:sym typeface="+mn-ea"/>
+              </a:rPr>
+              <a:t>What We Found in Feature Engineering</a:t>
+            </a:r>
+            <a:endParaRPr lang="en-US" dirty="0"/>
+          </a:p>
+        </p:txBody>
+      </p:sp>
+      <p:pic>
+        <p:nvPicPr>
+          <p:cNvPr id="4" name="图片 3"/>
+          <p:cNvPicPr>
+            <a:picLocks noChangeAspect="1"/>
+          </p:cNvPicPr>
+          <p:nvPr>
+            <p:custDataLst>
+              <p:tags r:id="rId1"/>
+            </p:custDataLst>
+          </p:nvPr>
+        </p:nvPicPr>
+        <p:blipFill>
+          <a:blip r:embed="rId5"/>
+          <a:stretch>
+            <a:fillRect/>
+          </a:stretch>
+        </p:blipFill>
+        <p:spPr>
+          <a:xfrm>
+            <a:off x="6359525" y="2706370"/>
+            <a:ext cx="5039360" cy="3453130"/>
+          </a:xfrm>
+          <a:prstGeom prst="rect">
+            <a:avLst/>
+          </a:prstGeom>
+        </p:spPr>
+      </p:pic>
+      <p:pic>
+        <p:nvPicPr>
+          <p:cNvPr id="5" name="图片 4"/>
+          <p:cNvPicPr>
+            <a:picLocks noChangeAspect="1"/>
+          </p:cNvPicPr>
+          <p:nvPr>
+            <p:custDataLst>
+              <p:tags r:id="rId2"/>
+            </p:custDataLst>
+          </p:nvPr>
+        </p:nvPicPr>
+        <p:blipFill>
+          <a:blip r:embed="rId6"/>
+          <a:stretch>
+            <a:fillRect/>
+          </a:stretch>
+        </p:blipFill>
+        <p:spPr>
+          <a:xfrm>
+            <a:off x="917575" y="2706370"/>
+            <a:ext cx="5067300" cy="3468370"/>
+          </a:xfrm>
+          <a:prstGeom prst="rect">
+            <a:avLst/>
+          </a:prstGeom>
+        </p:spPr>
+      </p:pic>
+      <p:sp>
+        <p:nvSpPr>
+          <p:cNvPr id="7" name="文本框 6"/>
+          <p:cNvSpPr txBox="1"/>
+          <p:nvPr/>
+        </p:nvSpPr>
+        <p:spPr>
+          <a:xfrm>
+            <a:off x="2599055" y="6297930"/>
+            <a:ext cx="1704340" cy="368300"/>
+          </a:xfrm>
+          <a:prstGeom prst="rect">
+            <a:avLst/>
+          </a:prstGeom>
+          <a:noFill/>
+        </p:spPr>
+        <p:txBody>
+          <a:bodyPr wrap="square" rtlCol="0">
+            <a:spAutoFit/>
+          </a:bodyPr>
+          <a:lstStyle/>
+          <a:p>
+            <a:r>
+              <a:rPr lang="en-US" altLang="zh-CN" dirty="0"/>
+              <a:t>Damage Bad</a:t>
+            </a:r>
+          </a:p>
+        </p:txBody>
+      </p:sp>
+      <p:sp>
+        <p:nvSpPr>
+          <p:cNvPr id="12" name="文本框 11"/>
+          <p:cNvSpPr txBox="1"/>
+          <p:nvPr>
+            <p:custDataLst>
+              <p:tags r:id="rId3"/>
+            </p:custDataLst>
+          </p:nvPr>
+        </p:nvSpPr>
+        <p:spPr>
+          <a:xfrm>
+            <a:off x="8027035" y="6297930"/>
+            <a:ext cx="1704340" cy="368300"/>
+          </a:xfrm>
+          <a:prstGeom prst="rect">
+            <a:avLst/>
+          </a:prstGeom>
+          <a:noFill/>
+        </p:spPr>
+        <p:txBody>
+          <a:bodyPr wrap="square" rtlCol="0">
+            <a:spAutoFit/>
+          </a:bodyPr>
+          <a:lstStyle/>
+          <a:p>
+            <a:r>
+              <a:rPr lang="en-US" altLang="zh-CN" dirty="0"/>
+              <a:t>Damage Slight</a:t>
+            </a:r>
+          </a:p>
+        </p:txBody>
+      </p:sp>
+      <p:sp>
+        <p:nvSpPr>
+          <p:cNvPr id="6" name="Foliennummernplatzhalter 5">
+            <a:extLst>
+              <a:ext uri="{FF2B5EF4-FFF2-40B4-BE49-F238E27FC236}">
+                <a16:creationId xmlns:a16="http://schemas.microsoft.com/office/drawing/2014/main" id="{FE196D63-E9EA-F482-0209-441402685E31}"/>
+              </a:ext>
+            </a:extLst>
+          </p:cNvPr>
+          <p:cNvSpPr>
+            <a:spLocks noGrp="1"/>
+          </p:cNvSpPr>
+          <p:nvPr>
+            <p:ph type="sldNum" sz="quarter" idx="12"/>
+          </p:nvPr>
+        </p:nvSpPr>
+        <p:spPr/>
+        <p:txBody>
+          <a:bodyPr/>
+          <a:lstStyle/>
+          <a:p>
+            <a:fld id="{977BA8E6-E826-B147-AA17-E3D76A29629C}" type="slidenum">
+              <a:rPr kumimoji="1" lang="zh-CN" altLang="en-US" smtClean="0"/>
+              <a:t>13</a:t>
+            </a:fld>
+            <a:endParaRPr kumimoji="1" lang="zh-CN" altLang="en-US"/>
+          </a:p>
+        </p:txBody>
+      </p:sp>
+    </p:spTree>
+  </p:cSld>
+  <p:clrMapOvr>
+    <a:masterClrMapping/>
+  </p:clrMapOvr>
+</p:sld>
+</file>
+
+<file path=ppt/slides/slide14.xml><?xml version="1.0" encoding="utf-8"?>
+<p:sld xmlns:a="http://schemas.openxmlformats.org/drawingml/2006/main" xmlns:r="http://schemas.openxmlformats.org/officeDocument/2006/relationships" xmlns:p="http://schemas.openxmlformats.org/presentationml/2006/main">
+  <p:cSld>
+    <p:spTree>
+      <p:nvGrpSpPr>
+        <p:cNvPr id="1" name=""/>
+        <p:cNvGrpSpPr/>
+        <p:nvPr/>
+      </p:nvGrpSpPr>
+      <p:grpSpPr>
+        <a:xfrm>
+          <a:off x="0" y="0"/>
+          <a:ext cx="0" cy="0"/>
+          <a:chOff x="0" y="0"/>
+          <a:chExt cx="0" cy="0"/>
+        </a:xfrm>
+      </p:grpSpPr>
+      <p:sp>
+        <p:nvSpPr>
+          <p:cNvPr id="2" name="内容占位符 1"/>
+          <p:cNvSpPr>
+            <a:spLocks noGrp="1"/>
+          </p:cNvSpPr>
+          <p:nvPr>
+            <p:ph idx="1"/>
+          </p:nvPr>
+        </p:nvSpPr>
+        <p:spPr/>
+        <p:txBody>
+          <a:bodyPr>
+            <a:normAutofit/>
+          </a:bodyPr>
+          <a:lstStyle/>
+          <a:p>
+            <a:endParaRPr kumimoji="1" lang="en-US" altLang="zh-CN" b="1" dirty="0">
+              <a:sym typeface="Wingdings" panose="05000000000000000000" pitchFamily="2" charset="2"/>
+            </a:endParaRPr>
+          </a:p>
+          <a:p>
+            <a:r>
+              <a:rPr kumimoji="1" lang="en-US" altLang="zh-CN" dirty="0"/>
+              <a:t>Why Do Traditional Machine Learning Methods Outperform Neural Networks ?</a:t>
+            </a:r>
+          </a:p>
+          <a:p>
+            <a:r>
+              <a:rPr kumimoji="1" lang="en-US" altLang="zh-CN" dirty="0"/>
+              <a:t>Why Do These Data Processing Methods Lead to a Decrease in Model Performance ?</a:t>
+            </a:r>
+          </a:p>
+          <a:p>
+            <a:pPr lvl="1"/>
+            <a:r>
+              <a:rPr kumimoji="1" lang="zh-CN" altLang="en-US" sz="1600" dirty="0">
+                <a:sym typeface="+mn-ea"/>
+              </a:rPr>
+              <a:t>Data Augmentation</a:t>
+            </a:r>
+            <a:endParaRPr kumimoji="1" lang="zh-CN" altLang="en-US" sz="1600" dirty="0"/>
+          </a:p>
+          <a:p>
+            <a:pPr lvl="1" algn="l"/>
+            <a:r>
+              <a:rPr kumimoji="1" lang="zh-CN" altLang="en-US" sz="1600" dirty="0">
+                <a:sym typeface="+mn-ea"/>
+              </a:rPr>
+              <a:t>Anomaly Detection</a:t>
+            </a:r>
+            <a:endParaRPr kumimoji="1" lang="zh-CN" altLang="en-US" sz="1600" dirty="0"/>
+          </a:p>
+          <a:p>
+            <a:pPr lvl="1" algn="l"/>
+            <a:r>
+              <a:rPr kumimoji="1" lang="zh-CN" altLang="en-US" sz="1600" dirty="0">
+                <a:sym typeface="+mn-ea"/>
+              </a:rPr>
+              <a:t>Shuffle Data</a:t>
+            </a:r>
+            <a:endParaRPr kumimoji="1" lang="zh-CN" altLang="en-US" sz="1600" dirty="0"/>
+          </a:p>
+          <a:p>
+            <a:pPr lvl="1" algn="l"/>
+            <a:r>
+              <a:rPr kumimoji="1" lang="zh-CN" altLang="en-US" sz="1600" dirty="0">
+                <a:sym typeface="+mn-ea"/>
+              </a:rPr>
+              <a:t>One-Hot Encoding</a:t>
+            </a:r>
+            <a:endParaRPr kumimoji="1" lang="zh-CN" altLang="en-US" dirty="0"/>
+          </a:p>
+          <a:p>
+            <a:r>
+              <a:rPr kumimoji="1" lang="en-US" altLang="zh-CN" dirty="0"/>
+              <a:t>What We Found in Feature Engineering ?</a:t>
+            </a:r>
+          </a:p>
+          <a:p>
+            <a:pPr lvl="1"/>
+            <a:endParaRPr kumimoji="1" lang="en-US" altLang="zh-CN" dirty="0"/>
+          </a:p>
+          <a:p>
+            <a:endParaRPr kumimoji="1" lang="en-US" altLang="zh-CN" dirty="0"/>
+          </a:p>
+        </p:txBody>
+      </p:sp>
+      <p:sp>
+        <p:nvSpPr>
+          <p:cNvPr id="3" name="标题 2"/>
+          <p:cNvSpPr>
+            <a:spLocks noGrp="1"/>
+          </p:cNvSpPr>
+          <p:nvPr>
+            <p:ph type="title"/>
+          </p:nvPr>
+        </p:nvSpPr>
+        <p:spPr/>
+        <p:txBody>
+          <a:bodyPr/>
+          <a:lstStyle/>
+          <a:p>
+            <a:r>
+              <a:rPr lang="en-US" dirty="0"/>
+              <a:t>conclusion and discussion</a:t>
+            </a:r>
+          </a:p>
+        </p:txBody>
+      </p:sp>
+      <p:sp>
+        <p:nvSpPr>
+          <p:cNvPr id="4" name="Foliennummernplatzhalter 3">
+            <a:extLst>
+              <a:ext uri="{FF2B5EF4-FFF2-40B4-BE49-F238E27FC236}">
+                <a16:creationId xmlns:a16="http://schemas.microsoft.com/office/drawing/2014/main" id="{D72C93E5-1727-D76C-80A3-165172E7F577}"/>
+              </a:ext>
+            </a:extLst>
+          </p:cNvPr>
+          <p:cNvSpPr>
+            <a:spLocks noGrp="1"/>
+          </p:cNvSpPr>
+          <p:nvPr>
+            <p:ph type="sldNum" sz="quarter" idx="12"/>
+          </p:nvPr>
+        </p:nvSpPr>
+        <p:spPr/>
+        <p:txBody>
+          <a:bodyPr/>
+          <a:lstStyle/>
+          <a:p>
+            <a:fld id="{977BA8E6-E826-B147-AA17-E3D76A29629C}" type="slidenum">
+              <a:rPr kumimoji="1" lang="zh-CN" altLang="en-US" smtClean="0"/>
+              <a:t>14</a:t>
+            </a:fld>
+            <a:endParaRPr kumimoji="1" lang="zh-CN" altLang="en-US"/>
+          </a:p>
+        </p:txBody>
+      </p:sp>
+    </p:spTree>
+  </p:cSld>
+  <p:clrMapOvr>
+    <a:masterClrMapping/>
+  </p:clrMapOvr>
+</p:sld>
+</file>
+
+<file path=ppt/slides/slide15.xml><?xml version="1.0" encoding="utf-8"?>
+<p:sld xmlns:a="http://schemas.openxmlformats.org/drawingml/2006/main" xmlns:r="http://schemas.openxmlformats.org/officeDocument/2006/relationships" xmlns:p="http://schemas.openxmlformats.org/presentationml/2006/main">
+  <p:cSld>
+    <p:spTree>
+      <p:nvGrpSpPr>
+        <p:cNvPr id="1" name=""/>
+        <p:cNvGrpSpPr/>
+        <p:nvPr/>
+      </p:nvGrpSpPr>
+      <p:grpSpPr>
+        <a:xfrm>
+          <a:off x="0" y="0"/>
+          <a:ext cx="0" cy="0"/>
+          <a:chOff x="0" y="0"/>
+          <a:chExt cx="0" cy="0"/>
+        </a:xfrm>
+      </p:grpSpPr>
+      <p:sp>
+        <p:nvSpPr>
+          <p:cNvPr id="2" name="标题 1"/>
+          <p:cNvSpPr>
+            <a:spLocks noGrp="1"/>
+          </p:cNvSpPr>
+          <p:nvPr>
+            <p:ph type="ctrTitle"/>
+          </p:nvPr>
+        </p:nvSpPr>
+        <p:spPr/>
+        <p:txBody>
+          <a:bodyPr/>
+          <a:lstStyle/>
+          <a:p>
+            <a:r>
+              <a:rPr kumimoji="1" lang="en-US" altLang="zh-CN" dirty="0"/>
+              <a:t>Thank you!</a:t>
+            </a:r>
+            <a:endParaRPr kumimoji="1" lang="zh-CN" altLang="en-US" dirty="0"/>
+          </a:p>
+        </p:txBody>
+      </p:sp>
+      <p:sp>
+        <p:nvSpPr>
+          <p:cNvPr id="3" name="副标题 2"/>
+          <p:cNvSpPr>
+            <a:spLocks noGrp="1"/>
+          </p:cNvSpPr>
+          <p:nvPr>
+            <p:ph type="subTitle" idx="1"/>
+          </p:nvPr>
+        </p:nvSpPr>
+        <p:spPr/>
+        <p:txBody>
+          <a:bodyPr>
+            <a:normAutofit/>
+          </a:bodyPr>
+          <a:lstStyle/>
+          <a:p>
+            <a:endParaRPr kumimoji="1" lang="en-US" altLang="zh-CN" dirty="0"/>
+          </a:p>
+          <a:p>
+            <a:endParaRPr kumimoji="1" lang="en-US" altLang="zh-CN" dirty="0"/>
+          </a:p>
+        </p:txBody>
+      </p:sp>
+      <p:sp>
+        <p:nvSpPr>
+          <p:cNvPr id="4" name="Foliennummernplatzhalter 3">
+            <a:extLst>
+              <a:ext uri="{FF2B5EF4-FFF2-40B4-BE49-F238E27FC236}">
+                <a16:creationId xmlns:a16="http://schemas.microsoft.com/office/drawing/2014/main" id="{51437B79-B4E4-16E5-764A-0DE3DC57BD52}"/>
+              </a:ext>
+            </a:extLst>
+          </p:cNvPr>
+          <p:cNvSpPr>
+            <a:spLocks noGrp="1"/>
+          </p:cNvSpPr>
+          <p:nvPr>
+            <p:ph type="sldNum" sz="quarter" idx="12"/>
+          </p:nvPr>
+        </p:nvSpPr>
+        <p:spPr/>
+        <p:txBody>
+          <a:bodyPr/>
+          <a:lstStyle/>
+          <a:p>
+            <a:fld id="{977BA8E6-E826-B147-AA17-E3D76A29629C}" type="slidenum">
+              <a:rPr kumimoji="1" lang="zh-CN" altLang="en-US" smtClean="0"/>
+              <a:t>15</a:t>
+            </a:fld>
+            <a:endParaRPr kumimoji="1" lang="zh-CN" altLang="en-US"/>
           </a:p>
         </p:txBody>
       </p:sp>
@@ -5038,6 +6138,35 @@
           </a:p>
         </p:txBody>
       </p:sp>
+      <p:sp>
+        <p:nvSpPr>
+          <p:cNvPr id="4" name="Foliennummernplatzhalter 3">
+            <a:extLst>
+              <a:ext uri="{FF2B5EF4-FFF2-40B4-BE49-F238E27FC236}">
+                <a16:creationId xmlns:a16="http://schemas.microsoft.com/office/drawing/2014/main" id="{C55F9259-78F5-959C-F056-779E11EE1EA9}"/>
+              </a:ext>
+            </a:extLst>
+          </p:cNvPr>
+          <p:cNvSpPr>
+            <a:spLocks noGrp="1"/>
+          </p:cNvSpPr>
+          <p:nvPr>
+            <p:ph type="sldNum" sz="quarter" idx="12"/>
+          </p:nvPr>
+        </p:nvSpPr>
+        <p:spPr/>
+        <p:txBody>
+          <a:bodyPr/>
+          <a:lstStyle/>
+          <a:p>
+            <a:fld id="{977BA8E6-E826-B147-AA17-E3D76A29629C}" type="slidenum">
+              <a:rPr kumimoji="1" lang="zh-CN" altLang="en-US" smtClean="0"/>
+              <a:t>2</a:t>
+            </a:fld>
+            <a:endParaRPr kumimoji="1" lang="zh-CN" altLang="en-US"/>
+          </a:p>
+        </p:txBody>
+      </p:sp>
     </p:spTree>
   </p:cSld>
   <p:clrMapOvr>
@@ -5180,6 +6309,35 @@
           </a:p>
         </p:txBody>
       </p:sp>
+      <p:sp>
+        <p:nvSpPr>
+          <p:cNvPr id="4" name="Foliennummernplatzhalter 3">
+            <a:extLst>
+              <a:ext uri="{FF2B5EF4-FFF2-40B4-BE49-F238E27FC236}">
+                <a16:creationId xmlns:a16="http://schemas.microsoft.com/office/drawing/2014/main" id="{D5E9CDE1-EB0B-57A3-6CAD-E1E2E3C5684D}"/>
+              </a:ext>
+            </a:extLst>
+          </p:cNvPr>
+          <p:cNvSpPr>
+            <a:spLocks noGrp="1"/>
+          </p:cNvSpPr>
+          <p:nvPr>
+            <p:ph type="sldNum" sz="quarter" idx="12"/>
+          </p:nvPr>
+        </p:nvSpPr>
+        <p:spPr/>
+        <p:txBody>
+          <a:bodyPr/>
+          <a:lstStyle/>
+          <a:p>
+            <a:fld id="{977BA8E6-E826-B147-AA17-E3D76A29629C}" type="slidenum">
+              <a:rPr kumimoji="1" lang="zh-CN" altLang="en-US" smtClean="0"/>
+              <a:t>3</a:t>
+            </a:fld>
+            <a:endParaRPr kumimoji="1" lang="zh-CN" altLang="en-US"/>
+          </a:p>
+        </p:txBody>
+      </p:sp>
     </p:spTree>
   </p:cSld>
   <p:clrMapOvr>
@@ -5324,6 +6482,35 @@
               <a:rPr lang="en-US" dirty="0"/>
               <a:t>Data pre-Processing</a:t>
             </a:r>
+          </a:p>
+        </p:txBody>
+      </p:sp>
+      <p:sp>
+        <p:nvSpPr>
+          <p:cNvPr id="4" name="Foliennummernplatzhalter 3">
+            <a:extLst>
+              <a:ext uri="{FF2B5EF4-FFF2-40B4-BE49-F238E27FC236}">
+                <a16:creationId xmlns:a16="http://schemas.microsoft.com/office/drawing/2014/main" id="{2303881A-5166-0B41-40A8-71A70BA48AA3}"/>
+              </a:ext>
+            </a:extLst>
+          </p:cNvPr>
+          <p:cNvSpPr>
+            <a:spLocks noGrp="1"/>
+          </p:cNvSpPr>
+          <p:nvPr>
+            <p:ph type="sldNum" sz="quarter" idx="12"/>
+          </p:nvPr>
+        </p:nvSpPr>
+        <p:spPr/>
+        <p:txBody>
+          <a:bodyPr/>
+          <a:lstStyle/>
+          <a:p>
+            <a:fld id="{977BA8E6-E826-B147-AA17-E3D76A29629C}" type="slidenum">
+              <a:rPr kumimoji="1" lang="zh-CN" altLang="en-US" smtClean="0"/>
+              <a:t>4</a:t>
+            </a:fld>
+            <a:endParaRPr kumimoji="1" lang="zh-CN" altLang="en-US"/>
           </a:p>
         </p:txBody>
       </p:sp>
@@ -5757,6 +6944,35 @@
           </a:graphicData>
         </a:graphic>
       </p:graphicFrame>
+      <p:sp>
+        <p:nvSpPr>
+          <p:cNvPr id="5" name="Foliennummernplatzhalter 4">
+            <a:extLst>
+              <a:ext uri="{FF2B5EF4-FFF2-40B4-BE49-F238E27FC236}">
+                <a16:creationId xmlns:a16="http://schemas.microsoft.com/office/drawing/2014/main" id="{C2ED486C-E784-08E7-68E6-C12E5CF4A4C2}"/>
+              </a:ext>
+            </a:extLst>
+          </p:cNvPr>
+          <p:cNvSpPr>
+            <a:spLocks noGrp="1"/>
+          </p:cNvSpPr>
+          <p:nvPr>
+            <p:ph type="sldNum" sz="quarter" idx="12"/>
+          </p:nvPr>
+        </p:nvSpPr>
+        <p:spPr/>
+        <p:txBody>
+          <a:bodyPr/>
+          <a:lstStyle/>
+          <a:p>
+            <a:fld id="{977BA8E6-E826-B147-AA17-E3D76A29629C}" type="slidenum">
+              <a:rPr kumimoji="1" lang="zh-CN" altLang="en-US" smtClean="0"/>
+              <a:t>5</a:t>
+            </a:fld>
+            <a:endParaRPr kumimoji="1" lang="zh-CN" altLang="en-US"/>
+          </a:p>
+        </p:txBody>
+      </p:sp>
     </p:spTree>
   </p:cSld>
   <p:clrMapOvr>
@@ -5969,6 +7185,35 @@
           <a:lstStyle/>
           <a:p>
             <a:endParaRPr lang="en-US" dirty="0"/>
+          </a:p>
+        </p:txBody>
+      </p:sp>
+      <p:sp>
+        <p:nvSpPr>
+          <p:cNvPr id="4" name="Foliennummernplatzhalter 3">
+            <a:extLst>
+              <a:ext uri="{FF2B5EF4-FFF2-40B4-BE49-F238E27FC236}">
+                <a16:creationId xmlns:a16="http://schemas.microsoft.com/office/drawing/2014/main" id="{FD30AC70-89C0-7C30-92E6-2159977AE5B0}"/>
+              </a:ext>
+            </a:extLst>
+          </p:cNvPr>
+          <p:cNvSpPr>
+            <a:spLocks noGrp="1"/>
+          </p:cNvSpPr>
+          <p:nvPr>
+            <p:ph type="sldNum" sz="quarter" idx="12"/>
+          </p:nvPr>
+        </p:nvSpPr>
+        <p:spPr/>
+        <p:txBody>
+          <a:bodyPr/>
+          <a:lstStyle/>
+          <a:p>
+            <a:fld id="{977BA8E6-E826-B147-AA17-E3D76A29629C}" type="slidenum">
+              <a:rPr kumimoji="1" lang="zh-CN" altLang="en-US" smtClean="0"/>
+              <a:t>6</a:t>
+            </a:fld>
+            <a:endParaRPr kumimoji="1" lang="zh-CN" altLang="en-US"/>
           </a:p>
         </p:txBody>
       </p:sp>
@@ -6123,6 +7368,35 @@
           </a:prstGeom>
         </p:spPr>
       </p:pic>
+      <p:sp>
+        <p:nvSpPr>
+          <p:cNvPr id="2" name="Foliennummernplatzhalter 1">
+            <a:extLst>
+              <a:ext uri="{FF2B5EF4-FFF2-40B4-BE49-F238E27FC236}">
+                <a16:creationId xmlns:a16="http://schemas.microsoft.com/office/drawing/2014/main" id="{B6B94D98-DE20-097C-BD5A-A7B46589851E}"/>
+              </a:ext>
+            </a:extLst>
+          </p:cNvPr>
+          <p:cNvSpPr>
+            <a:spLocks noGrp="1"/>
+          </p:cNvSpPr>
+          <p:nvPr>
+            <p:ph type="sldNum" sz="quarter" idx="12"/>
+          </p:nvPr>
+        </p:nvSpPr>
+        <p:spPr/>
+        <p:txBody>
+          <a:bodyPr/>
+          <a:lstStyle/>
+          <a:p>
+            <a:fld id="{977BA8E6-E826-B147-AA17-E3D76A29629C}" type="slidenum">
+              <a:rPr kumimoji="1" lang="zh-CN" altLang="en-US" smtClean="0"/>
+              <a:t>7</a:t>
+            </a:fld>
+            <a:endParaRPr kumimoji="1" lang="zh-CN" altLang="en-US"/>
+          </a:p>
+        </p:txBody>
+      </p:sp>
     </p:spTree>
     <p:extLst>
       <p:ext uri="{BB962C8B-B14F-4D97-AF65-F5344CB8AC3E}">
@@ -6155,7 +7429,7 @@
       </p:grpSpPr>
       <p:sp>
         <p:nvSpPr>
-          <p:cNvPr id="2" name="内容占位符 1"/>
+          <p:cNvPr id="2" name="Inhaltsplatzhalter 1"/>
           <p:cNvSpPr>
             <a:spLocks noGrp="1"/>
           </p:cNvSpPr>
@@ -6165,82 +7439,478 @@
         </p:nvSpPr>
         <p:spPr>
           <a:xfrm>
-            <a:off x="581025" y="2090420"/>
-            <a:ext cx="11029315" cy="4341495"/>
+            <a:off x="581194" y="2180499"/>
+            <a:ext cx="11029615" cy="2909662"/>
           </a:xfrm>
         </p:spPr>
         <p:txBody>
-          <a:bodyPr>
-            <a:normAutofit/>
+          <a:bodyPr/>
+          <a:lstStyle/>
+          <a:p>
+            <a:pPr marL="0" indent="0">
+              <a:buNone/>
+            </a:pPr>
+            <a:r>
+              <a:rPr lang="en-US" dirty="0">
+                <a:sym typeface="Wingdings" panose="05000000000000000000" pitchFamily="2" charset="2"/>
+              </a:rPr>
+              <a:t>For each type of damage, we have developed a </a:t>
+            </a:r>
+            <a:r>
+              <a:rPr kumimoji="1" lang="en-US" altLang="zh-CN" dirty="0">
+                <a:sym typeface="Wingdings" pitchFamily="2" charset="2"/>
+              </a:rPr>
+              <a:t>Random Forest Classifier </a:t>
+            </a:r>
+            <a:r>
+              <a:rPr lang="en-US" dirty="0">
+                <a:sym typeface="Wingdings" panose="05000000000000000000" pitchFamily="2" charset="2"/>
+              </a:rPr>
+              <a:t>to decide whether an object is of this type.</a:t>
+            </a:r>
+          </a:p>
+          <a:p>
+            <a:pPr marL="0" indent="0">
+              <a:buNone/>
+            </a:pPr>
+            <a:endParaRPr lang="en-US" dirty="0"/>
+          </a:p>
+          <a:p>
+            <a:pPr marL="0" indent="0">
+              <a:buNone/>
+            </a:pPr>
+            <a:endParaRPr lang="en-US" dirty="0"/>
+          </a:p>
+          <a:p>
+            <a:pPr marL="0" indent="0">
+              <a:buNone/>
+            </a:pPr>
+            <a:endParaRPr lang="en-US" dirty="0"/>
+          </a:p>
+          <a:p>
+            <a:pPr marL="0" indent="0">
+              <a:buNone/>
+            </a:pPr>
+            <a:endParaRPr lang="en-US" dirty="0"/>
+          </a:p>
+          <a:p>
+            <a:pPr marL="0" indent="0">
+              <a:buNone/>
+            </a:pPr>
+            <a:endParaRPr lang="en-US" dirty="0"/>
+          </a:p>
+          <a:p>
+            <a:pPr marL="0" indent="0">
+              <a:buNone/>
+            </a:pPr>
+            <a:endParaRPr lang="en-US" dirty="0"/>
+          </a:p>
+          <a:p>
+            <a:pPr marL="0" indent="0">
+              <a:buNone/>
+            </a:pPr>
+            <a:endParaRPr lang="en-US" dirty="0"/>
+          </a:p>
+          <a:p>
+            <a:pPr marL="0" indent="0">
+              <a:buNone/>
+            </a:pPr>
+            <a:endParaRPr lang="en-US" dirty="0"/>
+          </a:p>
+          <a:p>
+            <a:pPr marL="0" indent="0">
+              <a:buNone/>
+            </a:pPr>
+            <a:endParaRPr lang="en-US" dirty="0"/>
+          </a:p>
+          <a:p>
+            <a:pPr marL="0" indent="0">
+              <a:buNone/>
+            </a:pPr>
+            <a:endParaRPr lang="en-US" dirty="0"/>
+          </a:p>
+        </p:txBody>
+      </p:sp>
+      <p:sp>
+        <p:nvSpPr>
+          <p:cNvPr id="3" name="Titel 2"/>
+          <p:cNvSpPr>
+            <a:spLocks noGrp="1"/>
+          </p:cNvSpPr>
+          <p:nvPr>
+            <p:ph type="title"/>
+          </p:nvPr>
+        </p:nvSpPr>
+        <p:spPr/>
+        <p:txBody>
+          <a:bodyPr/>
+          <a:lstStyle/>
+          <a:p>
+            <a:r>
+              <a:rPr lang="en-US" altLang="zh-CN" dirty="0"/>
+              <a:t>Other method: Multiple classifier</a:t>
+            </a:r>
+            <a:endParaRPr lang="en-US" dirty="0"/>
+          </a:p>
+        </p:txBody>
+      </p:sp>
+      <p:graphicFrame>
+        <p:nvGraphicFramePr>
+          <p:cNvPr id="4" name="Tabelle 4"/>
+          <p:cNvGraphicFramePr>
+            <a:graphicFrameLocks noGrp="1"/>
+          </p:cNvGraphicFramePr>
+          <p:nvPr>
+            <p:extLst>
+              <p:ext uri="{D42A27DB-BD31-4B8C-83A1-F6EECF244321}">
+                <p14:modId xmlns:p14="http://schemas.microsoft.com/office/powerpoint/2010/main" val="1681388819"/>
+              </p:ext>
+            </p:extLst>
+          </p:nvPr>
+        </p:nvGraphicFramePr>
+        <p:xfrm>
+          <a:off x="686597" y="2724249"/>
+          <a:ext cx="6511290" cy="2224001"/>
+        </p:xfrm>
+        <a:graphic>
+          <a:graphicData uri="http://schemas.openxmlformats.org/drawingml/2006/table">
+            <a:tbl>
+              <a:tblPr firstRow="1" bandRow="1">
+                <a:tableStyleId>{5C22544A-7EE6-4342-B048-85BDC9FD1C3A}</a:tableStyleId>
+              </a:tblPr>
+              <a:tblGrid>
+                <a:gridCol w="2447290">
+                  <a:extLst>
+                    <a:ext uri="{9D8B030D-6E8A-4147-A177-3AD203B41FA5}">
+                      <a16:colId xmlns:a16="http://schemas.microsoft.com/office/drawing/2014/main" val="20000"/>
+                    </a:ext>
+                  </a:extLst>
+                </a:gridCol>
+                <a:gridCol w="4064000">
+                  <a:extLst>
+                    <a:ext uri="{9D8B030D-6E8A-4147-A177-3AD203B41FA5}">
+                      <a16:colId xmlns:a16="http://schemas.microsoft.com/office/drawing/2014/main" val="20001"/>
+                    </a:ext>
+                  </a:extLst>
+                </a:gridCol>
+              </a:tblGrid>
+              <a:tr h="0">
+                <a:tc>
+                  <a:txBody>
+                    <a:bodyPr/>
+                    <a:lstStyle/>
+                    <a:p>
+                      <a:r>
+                        <a:rPr lang="en-US" dirty="0"/>
+                        <a:t>Type</a:t>
+                      </a:r>
+                    </a:p>
+                  </a:txBody>
+                  <a:tcPr/>
+                </a:tc>
+                <a:tc>
+                  <a:txBody>
+                    <a:bodyPr/>
+                    <a:lstStyle/>
+                    <a:p>
+                      <a:r>
+                        <a:rPr lang="en-US" dirty="0"/>
+                        <a:t>Accuracy</a:t>
+                      </a:r>
+                    </a:p>
+                  </a:txBody>
+                  <a:tcPr/>
+                </a:tc>
+                <a:extLst>
+                  <a:ext uri="{0D108BD9-81ED-4DB2-BD59-A6C34878D82A}">
+                    <a16:rowId xmlns:a16="http://schemas.microsoft.com/office/drawing/2014/main" val="10000"/>
+                  </a:ext>
+                </a:extLst>
+              </a:tr>
+              <a:tr h="370840">
+                <a:tc>
+                  <a:txBody>
+                    <a:bodyPr/>
+                    <a:lstStyle/>
+                    <a:p>
+                      <a:r>
+                        <a:rPr lang="en-US" altLang="zh-CN" sz="1800" kern="1200" dirty="0">
+                          <a:solidFill>
+                            <a:schemeClr val="dk1"/>
+                          </a:solidFill>
+                          <a:effectLst/>
+                          <a:latin typeface="+mn-lt"/>
+                          <a:ea typeface="+mn-ea"/>
+                          <a:cs typeface="+mn-cs"/>
+                        </a:rPr>
+                        <a:t>Normal</a:t>
+                      </a:r>
+                      <a:endParaRPr lang="en-US" dirty="0"/>
+                    </a:p>
+                  </a:txBody>
+                  <a:tcPr/>
+                </a:tc>
+                <a:tc>
+                  <a:txBody>
+                    <a:bodyPr/>
+                    <a:lstStyle/>
+                    <a:p>
+                      <a:r>
+                        <a:rPr lang="en-US" dirty="0"/>
+                        <a:t>96.3%</a:t>
+                      </a:r>
+                    </a:p>
+                  </a:txBody>
+                  <a:tcPr/>
+                </a:tc>
+                <a:extLst>
+                  <a:ext uri="{0D108BD9-81ED-4DB2-BD59-A6C34878D82A}">
+                    <a16:rowId xmlns:a16="http://schemas.microsoft.com/office/drawing/2014/main" val="10001"/>
+                  </a:ext>
+                </a:extLst>
+              </a:tr>
+              <a:tr h="374881">
+                <a:tc>
+                  <a:txBody>
+                    <a:bodyPr/>
+                    <a:lstStyle/>
+                    <a:p>
+                      <a:r>
+                        <a:rPr lang="en-US" altLang="zh-CN" sz="1800" kern="1200" dirty="0" err="1">
+                          <a:solidFill>
+                            <a:schemeClr val="dk1"/>
+                          </a:solidFill>
+                          <a:effectLst/>
+                          <a:latin typeface="+mn-lt"/>
+                          <a:ea typeface="+mn-ea"/>
+                          <a:cs typeface="+mn-cs"/>
+                        </a:rPr>
+                        <a:t>AddWeight</a:t>
+                      </a:r>
+                      <a:endParaRPr lang="en-US" b="1" dirty="0"/>
+                    </a:p>
+                  </a:txBody>
+                  <a:tcPr/>
+                </a:tc>
+                <a:tc>
+                  <a:txBody>
+                    <a:bodyPr/>
+                    <a:lstStyle/>
+                    <a:p>
+                      <a:r>
+                        <a:rPr lang="en-US" b="1" dirty="0"/>
+                        <a:t>100%</a:t>
+                      </a:r>
+                    </a:p>
+                  </a:txBody>
+                  <a:tcPr/>
+                </a:tc>
+                <a:extLst>
+                  <a:ext uri="{0D108BD9-81ED-4DB2-BD59-A6C34878D82A}">
+                    <a16:rowId xmlns:a16="http://schemas.microsoft.com/office/drawing/2014/main" val="10002"/>
+                  </a:ext>
+                </a:extLst>
+              </a:tr>
+              <a:tr h="370840">
+                <a:tc>
+                  <a:txBody>
+                    <a:bodyPr/>
+                    <a:lstStyle/>
+                    <a:p>
+                      <a:pPr marL="0" marR="0" lvl="0" indent="0" algn="l" defTabSz="457200" rtl="0" eaLnBrk="1" fontAlgn="auto" latinLnBrk="0" hangingPunct="1">
+                        <a:lnSpc>
+                          <a:spcPct val="100000"/>
+                        </a:lnSpc>
+                        <a:spcBef>
+                          <a:spcPts val="0"/>
+                        </a:spcBef>
+                        <a:spcAft>
+                          <a:spcPts val="0"/>
+                        </a:spcAft>
+                        <a:buClrTx/>
+                        <a:buSzTx/>
+                        <a:buFontTx/>
+                        <a:buNone/>
+                        <a:defRPr/>
+                      </a:pPr>
+                      <a:r>
+                        <a:rPr lang="en-US" altLang="zh-CN" sz="1800" kern="1200" dirty="0" err="1">
+                          <a:solidFill>
+                            <a:schemeClr val="dk1"/>
+                          </a:solidFill>
+                          <a:effectLst/>
+                          <a:latin typeface="+mn-lt"/>
+                          <a:ea typeface="+mn-ea"/>
+                          <a:cs typeface="+mn-cs"/>
+                        </a:rPr>
+                        <a:t>PressureGain_constant</a:t>
+                      </a:r>
+                      <a:endParaRPr lang="en-US" dirty="0">
+                        <a:sym typeface="Wingdings" panose="05000000000000000000" pitchFamily="2" charset="2"/>
+                      </a:endParaRPr>
+                    </a:p>
+                  </a:txBody>
+                  <a:tcPr/>
+                </a:tc>
+                <a:tc>
+                  <a:txBody>
+                    <a:bodyPr/>
+                    <a:lstStyle/>
+                    <a:p>
+                      <a:r>
+                        <a:rPr lang="en-US" b="1" dirty="0"/>
+                        <a:t>99.2%</a:t>
+                      </a:r>
+                    </a:p>
+                  </a:txBody>
+                  <a:tcPr/>
+                </a:tc>
+                <a:extLst>
+                  <a:ext uri="{0D108BD9-81ED-4DB2-BD59-A6C34878D82A}">
+                    <a16:rowId xmlns:a16="http://schemas.microsoft.com/office/drawing/2014/main" val="10003"/>
+                  </a:ext>
+                </a:extLst>
+              </a:tr>
+              <a:tr h="370840">
+                <a:tc>
+                  <a:txBody>
+                    <a:bodyPr/>
+                    <a:lstStyle/>
+                    <a:p>
+                      <a:r>
+                        <a:rPr lang="en-US" altLang="zh-CN" sz="1800" kern="1200" dirty="0" err="1">
+                          <a:solidFill>
+                            <a:schemeClr val="dk1"/>
+                          </a:solidFill>
+                          <a:effectLst/>
+                          <a:latin typeface="+mn-lt"/>
+                          <a:ea typeface="+mn-ea"/>
+                          <a:cs typeface="+mn-cs"/>
+                        </a:rPr>
+                        <a:t>PropellerDamage_bad</a:t>
+                      </a:r>
+                      <a:endParaRPr lang="en-US" dirty="0"/>
+                    </a:p>
+                  </a:txBody>
+                  <a:tcPr/>
+                </a:tc>
+                <a:tc>
+                  <a:txBody>
+                    <a:bodyPr/>
+                    <a:lstStyle/>
+                    <a:p>
+                      <a:r>
+                        <a:rPr lang="en-US" altLang="zh-CN" dirty="0"/>
+                        <a:t>96.3%</a:t>
+                      </a:r>
+                    </a:p>
+                  </a:txBody>
+                  <a:tcPr/>
+                </a:tc>
+                <a:extLst>
+                  <a:ext uri="{0D108BD9-81ED-4DB2-BD59-A6C34878D82A}">
+                    <a16:rowId xmlns:a16="http://schemas.microsoft.com/office/drawing/2014/main" val="10004"/>
+                  </a:ext>
+                </a:extLst>
+              </a:tr>
+              <a:tr h="370840">
+                <a:tc>
+                  <a:txBody>
+                    <a:bodyPr/>
+                    <a:lstStyle/>
+                    <a:p>
+                      <a:r>
+                        <a:rPr lang="en-US" altLang="zh-CN" sz="1800" kern="1200" dirty="0" err="1">
+                          <a:solidFill>
+                            <a:schemeClr val="dk1"/>
+                          </a:solidFill>
+                          <a:effectLst/>
+                          <a:latin typeface="+mn-lt"/>
+                          <a:ea typeface="+mn-ea"/>
+                          <a:cs typeface="+mn-cs"/>
+                        </a:rPr>
+                        <a:t>PropellerDamage_slight</a:t>
+                      </a:r>
+                      <a:endParaRPr lang="en-US" dirty="0"/>
+                    </a:p>
+                  </a:txBody>
+                  <a:tcPr/>
+                </a:tc>
+                <a:tc>
+                  <a:txBody>
+                    <a:bodyPr/>
+                    <a:lstStyle/>
+                    <a:p>
+                      <a:r>
+                        <a:rPr lang="en-US" dirty="0"/>
+                        <a:t>94.7%</a:t>
+                      </a:r>
+                    </a:p>
+                  </a:txBody>
+                  <a:tcPr/>
+                </a:tc>
+                <a:extLst>
+                  <a:ext uri="{0D108BD9-81ED-4DB2-BD59-A6C34878D82A}">
+                    <a16:rowId xmlns:a16="http://schemas.microsoft.com/office/drawing/2014/main" val="10005"/>
+                  </a:ext>
+                </a:extLst>
+              </a:tr>
+            </a:tbl>
+          </a:graphicData>
+        </a:graphic>
+      </p:graphicFrame>
+      <p:sp>
+        <p:nvSpPr>
+          <p:cNvPr id="5" name="文本框 4">
+            <a:extLst>
+              <a:ext uri="{FF2B5EF4-FFF2-40B4-BE49-F238E27FC236}">
+                <a16:creationId xmlns:a16="http://schemas.microsoft.com/office/drawing/2014/main" id="{CDB08A4B-54FA-0767-BE2B-ECF70BC8E311}"/>
+              </a:ext>
+            </a:extLst>
+          </p:cNvPr>
+          <p:cNvSpPr txBox="1"/>
+          <p:nvPr/>
+        </p:nvSpPr>
+        <p:spPr>
+          <a:xfrm>
+            <a:off x="581191" y="5033746"/>
+            <a:ext cx="11029615" cy="646331"/>
+          </a:xfrm>
+          <a:prstGeom prst="rect">
+            <a:avLst/>
+          </a:prstGeom>
+          <a:noFill/>
+        </p:spPr>
+        <p:txBody>
+          <a:bodyPr wrap="square" rtlCol="0">
+            <a:spAutoFit/>
           </a:bodyPr>
           <a:lstStyle/>
           <a:p>
-            <a:r>
-              <a:rPr kumimoji="1" lang="en-US" altLang="zh-CN" dirty="0"/>
-              <a:t>Simple RNN</a:t>
-            </a:r>
-          </a:p>
-          <a:p>
-            <a:pPr lvl="1"/>
-            <a:r>
-              <a:rPr kumimoji="1" lang="en-US" altLang="zh-CN" dirty="0"/>
-              <a:t>Layers, Learning Rate, Batch Size, Optimizer……</a:t>
-            </a:r>
-          </a:p>
-          <a:p>
-            <a:r>
-              <a:rPr kumimoji="1" lang="en-US" altLang="zh-CN" dirty="0"/>
-              <a:t>Add Ensemble </a:t>
-            </a:r>
-          </a:p>
-          <a:p>
-            <a:pPr lvl="1"/>
-            <a:r>
-              <a:rPr kumimoji="1" lang="en-US" altLang="zh-CN" dirty="0"/>
-              <a:t>Models Vote to Get the Final Prediction</a:t>
-            </a:r>
-          </a:p>
-          <a:p>
-            <a:pPr lvl="0"/>
-            <a:r>
-              <a:rPr kumimoji="1" lang="en-US" altLang="zh-CN" dirty="0"/>
-              <a:t>Use Meta Model</a:t>
-            </a:r>
-          </a:p>
-          <a:p>
-            <a:pPr lvl="1"/>
-            <a:r>
-              <a:rPr kumimoji="1" lang="en-US" altLang="zh-CN" dirty="0"/>
-              <a:t>Model Makes Final Prediction Based on the Base Models’ Prediction</a:t>
-            </a:r>
-          </a:p>
-          <a:p>
-            <a:pPr lvl="0"/>
-            <a:r>
-              <a:rPr kumimoji="1" lang="en-US" altLang="zh-CN" dirty="0"/>
-              <a:t>Parameter </a:t>
-            </a:r>
-            <a:r>
-              <a:rPr lang="en-US" dirty="0">
-                <a:sym typeface="+mn-ea"/>
-              </a:rPr>
-              <a:t>Tuning</a:t>
-            </a:r>
-          </a:p>
-          <a:p>
-            <a:pPr lvl="1"/>
-            <a:endParaRPr kumimoji="1" lang="en-US" altLang="zh-CN" dirty="0"/>
-          </a:p>
-        </p:txBody>
-      </p:sp>
-      <p:sp>
-        <p:nvSpPr>
-          <p:cNvPr id="3" name="标题 2"/>
-          <p:cNvSpPr>
-            <a:spLocks noGrp="1"/>
-          </p:cNvSpPr>
-          <p:nvPr>
-            <p:ph type="title"/>
+            <a:pPr marL="0" indent="0">
+              <a:buNone/>
+            </a:pPr>
+            <a:endParaRPr lang="en-US" altLang="zh-CN" dirty="0"/>
+          </a:p>
+          <a:p>
+            <a:endParaRPr lang="zh-CN" altLang="en-US" dirty="0"/>
+          </a:p>
+        </p:txBody>
+      </p:sp>
+      <p:sp>
+        <p:nvSpPr>
+          <p:cNvPr id="6" name="Foliennummernplatzhalter 5">
+            <a:extLst>
+              <a:ext uri="{FF2B5EF4-FFF2-40B4-BE49-F238E27FC236}">
+                <a16:creationId xmlns:a16="http://schemas.microsoft.com/office/drawing/2014/main" id="{B4A71D0F-EB10-519D-8584-8E68193A3C09}"/>
+              </a:ext>
+            </a:extLst>
+          </p:cNvPr>
+          <p:cNvSpPr>
+            <a:spLocks noGrp="1"/>
+          </p:cNvSpPr>
+          <p:nvPr>
+            <p:ph type="sldNum" sz="quarter" idx="12"/>
           </p:nvPr>
         </p:nvSpPr>
         <p:spPr/>
@@ -6248,10 +7918,11 @@
           <a:bodyPr/>
           <a:lstStyle/>
           <a:p>
-            <a:r>
-              <a:rPr lang="en-US" dirty="0"/>
-              <a:t>What we do with rnn and what we get</a:t>
-            </a:r>
+            <a:fld id="{977BA8E6-E826-B147-AA17-E3D76A29629C}" type="slidenum">
+              <a:rPr kumimoji="1" lang="zh-CN" altLang="en-US" smtClean="0"/>
+              <a:t>8</a:t>
+            </a:fld>
+            <a:endParaRPr kumimoji="1" lang="zh-CN" altLang="en-US"/>
           </a:p>
         </p:txBody>
       </p:sp>
@@ -6290,81 +7961,164 @@
             <p:ph idx="1"/>
           </p:nvPr>
         </p:nvSpPr>
-        <p:spPr/>
+        <p:spPr>
+          <a:xfrm>
+            <a:off x="581025" y="2090420"/>
+            <a:ext cx="11029315" cy="4341495"/>
+          </a:xfrm>
+        </p:spPr>
         <p:txBody>
           <a:bodyPr>
             <a:normAutofit/>
           </a:bodyPr>
           <a:lstStyle/>
           <a:p>
-            <a:endParaRPr kumimoji="1" lang="en-US" altLang="zh-CN" b="1" dirty="0">
-              <a:sym typeface="Wingdings" panose="05000000000000000000" pitchFamily="2" charset="2"/>
-            </a:endParaRPr>
-          </a:p>
-          <a:p>
             <a:r>
               <a:rPr kumimoji="1" lang="en-US" altLang="zh-CN" dirty="0"/>
-              <a:t>Why Do Traditional Machine Learning Methods Outperform Neural Networks ?</a:t>
-            </a:r>
-          </a:p>
-          <a:p>
+              <a:t>Classify Method I:</a:t>
+            </a:r>
+          </a:p>
+          <a:p>
+            <a:pPr lvl="1"/>
             <a:r>
               <a:rPr kumimoji="1" lang="en-US" altLang="zh-CN" dirty="0"/>
-              <a:t>Why Do These Data Processing Methods Lead to a Decrease in Model Performance ?</a:t>
+              <a:t>For each object, we first decide if it can be classified into a single type using the 5 classifiers of the 5 types (Step 1)</a:t>
             </a:r>
           </a:p>
           <a:p>
             <a:pPr lvl="1"/>
             <a:r>
-              <a:rPr kumimoji="1" lang="zh-CN" altLang="en-US" sz="1600" dirty="0">
+              <a:rPr kumimoji="1" lang="en-US" altLang="zh-CN" dirty="0"/>
+              <a:t>If the object classification is ambiguous, use the random forest classifier developed before to decide its type (Step 2)</a:t>
+            </a:r>
+          </a:p>
+          <a:p>
+            <a:pPr lvl="1"/>
+            <a:r>
+              <a:rPr kumimoji="1" lang="en-US" altLang="zh-CN" b="1" dirty="0"/>
+              <a:t>Accuracy for classes </a:t>
+            </a:r>
+            <a:r>
+              <a:rPr lang="en-US" altLang="zh-CN" b="1" dirty="0"/>
+              <a:t>‘</a:t>
+            </a:r>
+            <a:r>
+              <a:rPr lang="en-US" altLang="zh-CN" b="1" dirty="0" err="1"/>
+              <a:t>AddWeight</a:t>
+            </a:r>
+            <a:r>
+              <a:rPr lang="en-US" altLang="zh-CN" b="1" dirty="0"/>
+              <a:t>’ and ‘</a:t>
+            </a:r>
+            <a:r>
+              <a:rPr lang="en-US" altLang="zh-CN" sz="1600" b="1" kern="1200" dirty="0" err="1">
+                <a:solidFill>
+                  <a:schemeClr val="dk1"/>
+                </a:solidFill>
+                <a:effectLst/>
+                <a:latin typeface="+mn-lt"/>
+                <a:ea typeface="+mn-ea"/>
+                <a:cs typeface="+mn-cs"/>
+              </a:rPr>
+              <a:t>PressureGain_constant</a:t>
+            </a:r>
+            <a:r>
+              <a:rPr lang="en-US" altLang="zh-CN" sz="1600" b="1" kern="1200" dirty="0">
+                <a:solidFill>
+                  <a:schemeClr val="dk1"/>
+                </a:solidFill>
+                <a:effectLst/>
+                <a:latin typeface="+mn-lt"/>
+                <a:ea typeface="+mn-ea"/>
+                <a:cs typeface="+mn-cs"/>
+              </a:rPr>
+              <a:t>’ </a:t>
+            </a:r>
+            <a:r>
+              <a:rPr lang="en-US" altLang="zh-CN" b="1" dirty="0">
+                <a:solidFill>
+                  <a:schemeClr val="dk1"/>
+                </a:solidFill>
+              </a:rPr>
+              <a:t>improved</a:t>
+            </a:r>
+            <a:endParaRPr kumimoji="1" lang="en-US" altLang="zh-CN" b="1" dirty="0"/>
+          </a:p>
+          <a:p>
+            <a:r>
+              <a:rPr kumimoji="1" lang="en-US" altLang="zh-CN" dirty="0"/>
+              <a:t>Classify Method II:</a:t>
+            </a:r>
+          </a:p>
+          <a:p>
+            <a:pPr lvl="1"/>
+            <a:r>
+              <a:rPr kumimoji="1" lang="en-US" altLang="zh-CN" dirty="0">
+                <a:solidFill>
+                  <a:schemeClr val="dk1"/>
+                </a:solidFill>
+              </a:rPr>
+              <a:t>Adaption: use improved classifiers from Method 1 </a:t>
+            </a:r>
+            <a:r>
+              <a:rPr kumimoji="1" lang="en-US" altLang="zh-CN" dirty="0">
+                <a:solidFill>
+                  <a:schemeClr val="dk1"/>
+                </a:solidFill>
+                <a:sym typeface="Wingdings" pitchFamily="2" charset="2"/>
+              </a:rPr>
+              <a:t> f</a:t>
+            </a:r>
+            <a:r>
+              <a:rPr kumimoji="1" lang="en-US" altLang="zh-CN" dirty="0"/>
+              <a:t>or others, use the original </a:t>
+            </a:r>
+            <a:r>
+              <a:rPr kumimoji="1" lang="en-US" altLang="zh-CN" dirty="0">
+                <a:sym typeface="Wingdings" pitchFamily="2" charset="2"/>
+              </a:rPr>
+              <a:t>Random Forest Classifier </a:t>
+            </a:r>
+          </a:p>
+          <a:p>
+            <a:pPr lvl="1"/>
+            <a:r>
+              <a:rPr kumimoji="1" lang="en-US" altLang="zh-CN" dirty="0"/>
+              <a:t>Accuracy: </a:t>
+            </a:r>
+            <a:r>
+              <a:rPr kumimoji="1" lang="en-US" altLang="zh-CN" b="1" dirty="0"/>
+              <a:t>97.1%</a:t>
+            </a:r>
+            <a:r>
+              <a:rPr kumimoji="1" lang="en-US" altLang="zh-CN" dirty="0"/>
+              <a:t> each </a:t>
+            </a:r>
+            <a:r>
+              <a:rPr kumimoji="1" lang="en-US" altLang="zh-CN" dirty="0">
+                <a:sym typeface="Wingdings" pitchFamily="2" charset="2"/>
+              </a:rPr>
+              <a:t>(vs. Random Forest Classifier: 97.5%)</a:t>
+            </a:r>
+            <a:endParaRPr kumimoji="1" lang="en-US" altLang="zh-CN" dirty="0"/>
+          </a:p>
+          <a:p>
+            <a:pPr marL="0" lvl="0" indent="0">
+              <a:buNone/>
+            </a:pPr>
+            <a:r>
+              <a:rPr kumimoji="1" lang="en-US" b="1" dirty="0">
+                <a:sym typeface="Wingdings" pitchFamily="2" charset="2"/>
+              </a:rPr>
+              <a:t> </a:t>
+            </a:r>
+            <a:r>
+              <a:rPr kumimoji="1" lang="en-US" b="1" dirty="0">
                 <a:sym typeface="+mn-ea"/>
               </a:rPr>
-              <a:t>Data Augmentation</a:t>
-            </a:r>
-            <a:endParaRPr kumimoji="1" lang="zh-CN" altLang="en-US" sz="1600" dirty="0"/>
-          </a:p>
-          <a:p>
-            <a:pPr lvl="1" algn="l"/>
-            <a:r>
-              <a:rPr kumimoji="1" lang="zh-CN" altLang="en-US" sz="1600" dirty="0">
-                <a:sym typeface="+mn-ea"/>
-              </a:rPr>
-              <a:t>Anomaly Detection</a:t>
-            </a:r>
-            <a:endParaRPr kumimoji="1" lang="zh-CN" altLang="en-US" sz="1600" dirty="0"/>
-          </a:p>
-          <a:p>
-            <a:pPr lvl="1" algn="l"/>
-            <a:r>
-              <a:rPr kumimoji="1" lang="zh-CN" altLang="en-US" sz="1600" dirty="0">
-                <a:sym typeface="+mn-ea"/>
-              </a:rPr>
-              <a:t>Shuffle Data</a:t>
-            </a:r>
-            <a:endParaRPr kumimoji="1" lang="zh-CN" altLang="en-US" sz="1600" dirty="0"/>
-          </a:p>
-          <a:p>
-            <a:pPr lvl="1" algn="l"/>
-            <a:r>
-              <a:rPr kumimoji="1" lang="zh-CN" altLang="en-US" sz="1600" dirty="0">
-                <a:sym typeface="+mn-ea"/>
-              </a:rPr>
-              <a:t>One-Hot Encoding</a:t>
-            </a:r>
-            <a:endParaRPr kumimoji="1" lang="zh-CN" altLang="en-US" dirty="0"/>
-          </a:p>
-          <a:p>
-            <a:r>
-              <a:rPr kumimoji="1" lang="en-US" altLang="zh-CN" dirty="0"/>
-              <a:t>What We Found in Feature Engineering ?</a:t>
-            </a:r>
-          </a:p>
-          <a:p>
-            <a:pPr lvl="1"/>
-            <a:endParaRPr kumimoji="1" lang="en-US" altLang="zh-CN" dirty="0"/>
-          </a:p>
-          <a:p>
-            <a:endParaRPr kumimoji="1" lang="en-US" altLang="zh-CN" dirty="0"/>
+              <a:t>No improvement</a:t>
+            </a:r>
+            <a:endParaRPr kumimoji="1" lang="en-US" altLang="zh-CN" b="1" dirty="0"/>
           </a:p>
         </p:txBody>
       </p:sp>
@@ -6384,9 +8138,39 @@
           <a:lstStyle/>
           <a:p>
             <a:r>
-              <a:rPr lang="en-US" dirty="0"/>
-              <a:t>conclusion and discussion</a:t>
-            </a:r>
+              <a:rPr lang="en-US" altLang="zh-CN" dirty="0"/>
+              <a:t>Other method: Multiple classifier</a:t>
+            </a:r>
+            <a:endParaRPr lang="en-US" dirty="0"/>
+          </a:p>
+        </p:txBody>
+      </p:sp>
+      <p:sp>
+        <p:nvSpPr>
+          <p:cNvPr id="4" name="Foliennummernplatzhalter 3">
+            <a:extLst>
+              <a:ext uri="{FF2B5EF4-FFF2-40B4-BE49-F238E27FC236}">
+                <a16:creationId xmlns:a16="http://schemas.microsoft.com/office/drawing/2014/main" id="{77D7F03A-7A99-CCF6-AFBF-3BBE73FD4D32}"/>
+              </a:ext>
+            </a:extLst>
+          </p:cNvPr>
+          <p:cNvSpPr>
+            <a:spLocks noGrp="1"/>
+          </p:cNvSpPr>
+          <p:nvPr>
+            <p:ph type="sldNum" sz="quarter" idx="12"/>
+          </p:nvPr>
+        </p:nvSpPr>
+        <p:spPr/>
+        <p:txBody>
+          <a:bodyPr/>
+          <a:lstStyle/>
+          <a:p>
+            <a:fld id="{977BA8E6-E826-B147-AA17-E3D76A29629C}" type="slidenum">
+              <a:rPr kumimoji="1" lang="zh-CN" altLang="en-US" smtClean="0"/>
+              <a:t>9</a:t>
+            </a:fld>
+            <a:endParaRPr kumimoji="1" lang="zh-CN" altLang="en-US"/>
           </a:p>
         </p:txBody>
       </p:sp>
@@ -6401,6 +8185,54 @@
 <file path=ppt/tags/tag1.xml><?xml version="1.0" encoding="utf-8"?>
 <p:tagLst xmlns:a="http://schemas.openxmlformats.org/drawingml/2006/main" xmlns:r="http://schemas.openxmlformats.org/officeDocument/2006/relationships" xmlns:p="http://schemas.openxmlformats.org/presentationml/2006/main">
   <p:tag name="COMMONDATA" val="eyJoZGlkIjoiZGEyNjRiOGVjNGQ4OGM0YzEzYzQ1MWZkNTM4MWNiNmEifQ=="/>
+</p:tagLst>
+</file>
+
+<file path=ppt/tags/tag2.xml><?xml version="1.0" encoding="utf-8"?>
+<p:tagLst xmlns:a="http://schemas.openxmlformats.org/drawingml/2006/main" xmlns:r="http://schemas.openxmlformats.org/officeDocument/2006/relationships" xmlns:p="http://schemas.openxmlformats.org/presentationml/2006/main">
+  <p:tag name="KSO_WM_BEAUTIFY_FLAG" val=""/>
+</p:tagLst>
+</file>
+
+<file path=ppt/tags/tag3.xml><?xml version="1.0" encoding="utf-8"?>
+<p:tagLst xmlns:a="http://schemas.openxmlformats.org/drawingml/2006/main" xmlns:r="http://schemas.openxmlformats.org/officeDocument/2006/relationships" xmlns:p="http://schemas.openxmlformats.org/presentationml/2006/main">
+  <p:tag name="KSO_WM_BEAUTIFY_FLAG" val=""/>
+</p:tagLst>
+</file>
+
+<file path=ppt/tags/tag4.xml><?xml version="1.0" encoding="utf-8"?>
+<p:tagLst xmlns:a="http://schemas.openxmlformats.org/drawingml/2006/main" xmlns:r="http://schemas.openxmlformats.org/officeDocument/2006/relationships" xmlns:p="http://schemas.openxmlformats.org/presentationml/2006/main">
+  <p:tag name="KSO_WM_BEAUTIFY_FLAG" val=""/>
+</p:tagLst>
+</file>
+
+<file path=ppt/tags/tag5.xml><?xml version="1.0" encoding="utf-8"?>
+<p:tagLst xmlns:a="http://schemas.openxmlformats.org/drawingml/2006/main" xmlns:r="http://schemas.openxmlformats.org/officeDocument/2006/relationships" xmlns:p="http://schemas.openxmlformats.org/presentationml/2006/main">
+  <p:tag name="KSO_WM_BEAUTIFY_FLAG" val=""/>
+</p:tagLst>
+</file>
+
+<file path=ppt/tags/tag6.xml><?xml version="1.0" encoding="utf-8"?>
+<p:tagLst xmlns:a="http://schemas.openxmlformats.org/drawingml/2006/main" xmlns:r="http://schemas.openxmlformats.org/officeDocument/2006/relationships" xmlns:p="http://schemas.openxmlformats.org/presentationml/2006/main">
+  <p:tag name="KSO_WM_BEAUTIFY_FLAG" val=""/>
+</p:tagLst>
+</file>
+
+<file path=ppt/tags/tag7.xml><?xml version="1.0" encoding="utf-8"?>
+<p:tagLst xmlns:a="http://schemas.openxmlformats.org/drawingml/2006/main" xmlns:r="http://schemas.openxmlformats.org/officeDocument/2006/relationships" xmlns:p="http://schemas.openxmlformats.org/presentationml/2006/main">
+  <p:tag name="KSO_WM_BEAUTIFY_FLAG" val=""/>
+</p:tagLst>
+</file>
+
+<file path=ppt/tags/tag8.xml><?xml version="1.0" encoding="utf-8"?>
+<p:tagLst xmlns:a="http://schemas.openxmlformats.org/drawingml/2006/main" xmlns:r="http://schemas.openxmlformats.org/officeDocument/2006/relationships" xmlns:p="http://schemas.openxmlformats.org/presentationml/2006/main">
+  <p:tag name="KSO_WM_BEAUTIFY_FLAG" val=""/>
+</p:tagLst>
+</file>
+
+<file path=ppt/tags/tag9.xml><?xml version="1.0" encoding="utf-8"?>
+<p:tagLst xmlns:a="http://schemas.openxmlformats.org/drawingml/2006/main" xmlns:r="http://schemas.openxmlformats.org/officeDocument/2006/relationships" xmlns:p="http://schemas.openxmlformats.org/presentationml/2006/main">
+  <p:tag name="KSO_WM_BEAUTIFY_FLAG" val=""/>
 </p:tagLst>
 </file>
 

</xml_diff>